<commit_message>
8 EE5 module and EE5003
Finished all my MSc course and exams
</commit_message>
<xml_diff>
--- a/EE5106/Part II Lecture by Sam Ge/2.1. Dynamics- Newton Euler.pptx
+++ b/EE5106/Part II Lecture by Sam Ge/2.1. Dynamics- Newton Euler.pptx
@@ -167,6 +167,27 @@
 </p:cmAuthorLst>
 </file>
 
+<file path=ppt/changesInfos/changesInfo1.xml><?xml version="1.0" encoding="utf-8"?>
+<pc:chgInfo xmlns:a="http://schemas.openxmlformats.org/drawingml/2006/main" xmlns:r="http://schemas.openxmlformats.org/officeDocument/2006/relationships" xmlns:ac="http://schemas.microsoft.com/office/drawing/2013/main/command" xmlns:pc="http://schemas.microsoft.com/office/powerpoint/2013/main/command">
+  <pc:docChgLst>
+    <pc:chgData name="Liu Weihao" userId="bf9d38cd-a913-4dee-be94-4828a28ae478" providerId="ADAL" clId="{8D068DA1-814B-4539-866D-92FFDFAD55D6}"/>
+    <pc:docChg chg="modSld">
+      <pc:chgData name="Liu Weihao" userId="bf9d38cd-a913-4dee-be94-4828a28ae478" providerId="ADAL" clId="{8D068DA1-814B-4539-866D-92FFDFAD55D6}" dt="2022-04-20T04:30:06.222" v="11" actId="20577"/>
+      <pc:docMkLst>
+        <pc:docMk/>
+      </pc:docMkLst>
+      <pc:sldChg chg="modNotesTx">
+        <pc:chgData name="Liu Weihao" userId="bf9d38cd-a913-4dee-be94-4828a28ae478" providerId="ADAL" clId="{8D068DA1-814B-4539-866D-92FFDFAD55D6}" dt="2022-04-20T04:30:06.222" v="11" actId="20577"/>
+        <pc:sldMkLst>
+          <pc:docMk/>
+          <pc:sldMk cId="356336245" sldId="783"/>
+        </pc:sldMkLst>
+      </pc:sldChg>
+    </pc:docChg>
+  </pc:docChgLst>
+</pc:chgInfo>
+</file>
+
 <file path=ppt/notesMasters/notesMaster1.xml><?xml version="1.0" encoding="utf-8"?>
 <p:notesMaster xmlns:a="http://schemas.openxmlformats.org/drawingml/2006/main" xmlns:r="http://schemas.openxmlformats.org/officeDocument/2006/relationships" xmlns:p="http://schemas.openxmlformats.org/presentationml/2006/main">
   <p:cSld>
@@ -249,7 +270,7 @@
           <a:p>
             <a:fld id="{CE082872-03E1-44DE-B79A-F833C59F5316}" type="datetimeFigureOut">
               <a:rPr lang="zh-CN" altLang="en-US" smtClean="0"/>
-              <a:t>2022/2/28</a:t>
+              <a:t>2022/4/20</a:t>
             </a:fld>
             <a:endParaRPr lang="zh-CN" altLang="en-US"/>
           </a:p>
@@ -2001,6 +2022,94 @@
     <p:extLst>
       <p:ext uri="{BB962C8B-B14F-4D97-AF65-F5344CB8AC3E}">
         <p14:creationId xmlns:p14="http://schemas.microsoft.com/office/powerpoint/2010/main" val="1358626397"/>
+      </p:ext>
+    </p:extLst>
+  </p:cSld>
+  <p:clrMapOvr>
+    <a:masterClrMapping/>
+  </p:clrMapOvr>
+</p:notes>
+</file>
+
+<file path=ppt/notesSlides/notesSlide7.xml><?xml version="1.0" encoding="utf-8"?>
+<p:notes xmlns:a="http://schemas.openxmlformats.org/drawingml/2006/main" xmlns:r="http://schemas.openxmlformats.org/officeDocument/2006/relationships" xmlns:p="http://schemas.openxmlformats.org/presentationml/2006/main">
+  <p:cSld>
+    <p:spTree>
+      <p:nvGrpSpPr>
+        <p:cNvPr id="1" name=""/>
+        <p:cNvGrpSpPr/>
+        <p:nvPr/>
+      </p:nvGrpSpPr>
+      <p:grpSpPr>
+        <a:xfrm>
+          <a:off x="0" y="0"/>
+          <a:ext cx="0" cy="0"/>
+          <a:chOff x="0" y="0"/>
+          <a:chExt cx="0" cy="0"/>
+        </a:xfrm>
+      </p:grpSpPr>
+      <p:sp>
+        <p:nvSpPr>
+          <p:cNvPr id="2" name="Slide Image Placeholder 1"/>
+          <p:cNvSpPr>
+            <a:spLocks noGrp="1" noRot="1" noChangeAspect="1"/>
+          </p:cNvSpPr>
+          <p:nvPr>
+            <p:ph type="sldImg"/>
+          </p:nvPr>
+        </p:nvSpPr>
+        <p:spPr/>
+      </p:sp>
+      <p:sp>
+        <p:nvSpPr>
+          <p:cNvPr id="3" name="Notes Placeholder 2"/>
+          <p:cNvSpPr>
+            <a:spLocks noGrp="1"/>
+          </p:cNvSpPr>
+          <p:nvPr>
+            <p:ph type="body" idx="1"/>
+          </p:nvPr>
+        </p:nvSpPr>
+        <p:spPr/>
+        <p:txBody>
+          <a:bodyPr/>
+          <a:lstStyle/>
+          <a:p>
+            <a:r>
+              <a:rPr lang="en-US" altLang="zh-CN" dirty="0"/>
+              <a:t>Test notes</a:t>
+            </a:r>
+            <a:endParaRPr lang="zh-CN" altLang="en-US" dirty="0"/>
+          </a:p>
+        </p:txBody>
+      </p:sp>
+      <p:sp>
+        <p:nvSpPr>
+          <p:cNvPr id="4" name="Slide Number Placeholder 3"/>
+          <p:cNvSpPr>
+            <a:spLocks noGrp="1"/>
+          </p:cNvSpPr>
+          <p:nvPr>
+            <p:ph type="sldNum" sz="quarter" idx="5"/>
+          </p:nvPr>
+        </p:nvSpPr>
+        <p:spPr/>
+        <p:txBody>
+          <a:bodyPr/>
+          <a:lstStyle/>
+          <a:p>
+            <a:fld id="{335FFF8E-E443-4442-89E0-F739F21A661D}" type="slidenum">
+              <a:rPr lang="zh-CN" altLang="en-US" smtClean="0"/>
+              <a:t>24</a:t>
+            </a:fld>
+            <a:endParaRPr lang="zh-CN" altLang="en-US"/>
+          </a:p>
+        </p:txBody>
+      </p:sp>
+    </p:spTree>
+    <p:extLst>
+      <p:ext uri="{BB962C8B-B14F-4D97-AF65-F5344CB8AC3E}">
+        <p14:creationId xmlns:p14="http://schemas.microsoft.com/office/powerpoint/2010/main" val="4251016161"/>
       </p:ext>
     </p:extLst>
   </p:cSld>
@@ -7676,7 +7785,7 @@
                 <a:spcPct val="0"/>
               </a:spcAft>
               <a:buBlip>
-                <a:blip r:embed="rId4"/>
+                <a:blip r:embed="rId3"/>
               </a:buBlip>
               <a:defRPr sz="2000">
                 <a:solidFill>
@@ -7727,7 +7836,7 @@
                 <a:spcPct val="0"/>
               </a:spcAft>
               <a:buBlip>
-                <a:blip r:embed="rId4"/>
+                <a:blip r:embed="rId3"/>
               </a:buBlip>
               <a:defRPr sz="1400" i="1">
                 <a:solidFill>
@@ -7878,7 +7987,7 @@
           <p:nvPr/>
         </p:nvPicPr>
         <p:blipFill>
-          <a:blip r:embed="rId5" cstate="print">
+          <a:blip r:embed="rId4" cstate="print">
             <a:extLst>
               <a:ext uri="{28A0092B-C50C-407E-A947-70E740481C1C}">
                 <a14:useLocalDpi xmlns:a14="http://schemas.microsoft.com/office/drawing/2010/main" val="0"/>
@@ -7945,23 +8054,23 @@
           <a:graphicData uri="http://schemas.openxmlformats.org/presentationml/2006/ole">
             <mc:AlternateContent xmlns:mc="http://schemas.openxmlformats.org/markup-compatibility/2006">
               <mc:Choice xmlns:v="urn:schemas-microsoft-com:vml" Requires="v">
-                <p:oleObj spid="_x0000_s38112" name="Equation" r:id="rId6" imgW="1193800" imgH="812800" progId="Equation.3">
+                <p:oleObj name="Equation" r:id="rId5" imgW="1193800" imgH="812800" progId="Equation.3">
                   <p:embed/>
                 </p:oleObj>
               </mc:Choice>
               <mc:Fallback>
-                <p:oleObj name="Equation" r:id="rId6" imgW="1193800" imgH="812800" progId="Equation.3">
+                <p:oleObj name="Equation" r:id="rId5" imgW="1193800" imgH="812800" progId="Equation.3">
                   <p:embed/>
                   <p:pic>
                     <p:nvPicPr>
-                      <p:cNvPr id="0" name="图片 27800"/>
+                      <p:cNvPr id="6" name="Object 38"/>
                       <p:cNvPicPr>
                         <a:picLocks noChangeAspect="1" noChangeArrowheads="1"/>
                       </p:cNvPicPr>
                       <p:nvPr/>
                     </p:nvPicPr>
                     <p:blipFill>
-                      <a:blip r:embed="rId7"/>
+                      <a:blip r:embed="rId6"/>
                       <a:srcRect/>
                       <a:stretch>
                         <a:fillRect/>
@@ -8315,23 +8424,23 @@
           <a:graphicData uri="http://schemas.openxmlformats.org/presentationml/2006/ole">
             <mc:AlternateContent xmlns:mc="http://schemas.openxmlformats.org/markup-compatibility/2006">
               <mc:Choice xmlns:v="urn:schemas-microsoft-com:vml" Requires="v">
-                <p:oleObj spid="_x0000_s38113" name="Equation" r:id="rId8" imgW="596900" imgH="177165" progId="Equation.3">
+                <p:oleObj name="Equation" r:id="rId7" imgW="596900" imgH="177165" progId="Equation.3">
                   <p:embed/>
                 </p:oleObj>
               </mc:Choice>
               <mc:Fallback>
-                <p:oleObj name="Equation" r:id="rId8" imgW="596900" imgH="177165" progId="Equation.3">
+                <p:oleObj name="Equation" r:id="rId7" imgW="596900" imgH="177165" progId="Equation.3">
                   <p:embed/>
                   <p:pic>
                     <p:nvPicPr>
-                      <p:cNvPr id="0" name="图片 27800"/>
+                      <p:cNvPr id="13" name="Object 38"/>
                       <p:cNvPicPr>
                         <a:picLocks noChangeAspect="1" noChangeArrowheads="1"/>
                       </p:cNvPicPr>
                       <p:nvPr/>
                     </p:nvPicPr>
                     <p:blipFill>
-                      <a:blip r:embed="rId9"/>
+                      <a:blip r:embed="rId8"/>
                       <a:srcRect/>
                       <a:stretch>
                         <a:fillRect/>
@@ -8426,7 +8535,7 @@
                 <a:spcPct val="20000"/>
               </a:spcBef>
               <a:buBlip>
-                <a:blip r:embed="rId4"/>
+                <a:blip r:embed="rId3"/>
               </a:buBlip>
               <a:defRPr sz="2000">
                 <a:solidFill>
@@ -8466,7 +8575,7 @@
                 <a:spcPct val="20000"/>
               </a:spcBef>
               <a:buBlip>
-                <a:blip r:embed="rId4"/>
+                <a:blip r:embed="rId3"/>
               </a:buBlip>
               <a:defRPr sz="1400" i="1">
                 <a:solidFill>
@@ -8636,7 +8745,7 @@
                 <a:spcPct val="20000"/>
               </a:spcBef>
               <a:buBlip>
-                <a:blip r:embed="rId4"/>
+                <a:blip r:embed="rId3"/>
               </a:buBlip>
               <a:defRPr sz="2000" b="0" kern="1200">
                 <a:solidFill>
@@ -8682,7 +8791,7 @@
                 <a:spcPct val="20000"/>
               </a:spcBef>
               <a:buBlip>
-                <a:blip r:embed="rId4"/>
+                <a:blip r:embed="rId3"/>
               </a:buBlip>
               <a:defRPr sz="1400" i="1" kern="1200">
                 <a:solidFill>
@@ -8873,7 +8982,7 @@
                 <a:spcPct val="20000"/>
               </a:spcBef>
               <a:buBlip>
-                <a:blip r:embed="rId4"/>
+                <a:blip r:embed="rId3"/>
               </a:buBlip>
               <a:defRPr sz="2000">
                 <a:solidFill>
@@ -8913,7 +9022,7 @@
                 <a:spcPct val="20000"/>
               </a:spcBef>
               <a:buBlip>
-                <a:blip r:embed="rId4"/>
+                <a:blip r:embed="rId3"/>
               </a:buBlip>
               <a:defRPr sz="1400" i="1">
                 <a:solidFill>
@@ -9024,7 +9133,7 @@
           <p:nvPr/>
         </p:nvPicPr>
         <p:blipFill>
-          <a:blip r:embed="rId10"/>
+          <a:blip r:embed="rId9"/>
           <a:stretch>
             <a:fillRect/>
           </a:stretch>
@@ -9041,7 +9150,7 @@
       </p:pic>
     </p:spTree>
     <p:custDataLst>
-      <p:tags r:id="rId2"/>
+      <p:tags r:id="rId1"/>
     </p:custDataLst>
   </p:cSld>
   <p:clrMapOvr>
@@ -9090,23 +9199,23 @@
           <a:graphicData uri="http://schemas.openxmlformats.org/presentationml/2006/ole">
             <mc:AlternateContent xmlns:mc="http://schemas.openxmlformats.org/markup-compatibility/2006">
               <mc:Choice xmlns:v="urn:schemas-microsoft-com:vml" Requires="v">
-                <p:oleObj spid="_x0000_s39356" name="Equation" r:id="rId4" imgW="914400" imgH="812800" progId="Equation.3">
+                <p:oleObj name="Equation" r:id="rId3" imgW="914400" imgH="812800" progId="Equation.3">
                   <p:embed/>
                 </p:oleObj>
               </mc:Choice>
               <mc:Fallback>
-                <p:oleObj name="Equation" r:id="rId4" imgW="914400" imgH="812800" progId="Equation.3">
+                <p:oleObj name="Equation" r:id="rId3" imgW="914400" imgH="812800" progId="Equation.3">
                   <p:embed/>
                   <p:pic>
                     <p:nvPicPr>
-                      <p:cNvPr id="0" name="图片 27800"/>
+                      <p:cNvPr id="6" name="Object 38"/>
                       <p:cNvPicPr>
                         <a:picLocks noChangeAspect="1" noChangeArrowheads="1"/>
                       </p:cNvPicPr>
                       <p:nvPr/>
                     </p:nvPicPr>
                     <p:blipFill>
-                      <a:blip r:embed="rId5"/>
+                      <a:blip r:embed="rId4"/>
                       <a:srcRect/>
                       <a:stretch>
                         <a:fillRect/>
@@ -9154,23 +9263,23 @@
           <a:graphicData uri="http://schemas.openxmlformats.org/presentationml/2006/ole">
             <mc:AlternateContent xmlns:mc="http://schemas.openxmlformats.org/markup-compatibility/2006">
               <mc:Choice xmlns:v="urn:schemas-microsoft-com:vml" Requires="v">
-                <p:oleObj spid="_x0000_s39357" name="Equation" r:id="rId6" imgW="520700" imgH="190500" progId="Equation.3">
+                <p:oleObj name="Equation" r:id="rId5" imgW="520700" imgH="190500" progId="Equation.3">
                   <p:embed/>
                 </p:oleObj>
               </mc:Choice>
               <mc:Fallback>
-                <p:oleObj name="Equation" r:id="rId6" imgW="520700" imgH="190500" progId="Equation.3">
+                <p:oleObj name="Equation" r:id="rId5" imgW="520700" imgH="190500" progId="Equation.3">
                   <p:embed/>
                   <p:pic>
                     <p:nvPicPr>
-                      <p:cNvPr id="0" name="图片 27800"/>
+                      <p:cNvPr id="13" name="Object 38"/>
                       <p:cNvPicPr>
                         <a:picLocks noChangeAspect="1" noChangeArrowheads="1"/>
                       </p:cNvPicPr>
                       <p:nvPr/>
                     </p:nvPicPr>
                     <p:blipFill>
-                      <a:blip r:embed="rId7"/>
+                      <a:blip r:embed="rId6"/>
                       <a:srcRect/>
                       <a:stretch>
                         <a:fillRect/>
@@ -9205,7 +9314,7 @@
           <p:nvPr/>
         </p:nvPicPr>
         <p:blipFill>
-          <a:blip r:embed="rId8">
+          <a:blip r:embed="rId7">
             <a:extLst>
               <a:ext uri="{28A0092B-C50C-407E-A947-70E740481C1C}">
                 <a14:useLocalDpi xmlns:a14="http://schemas.microsoft.com/office/drawing/2010/main" val="0"/>
@@ -9272,23 +9381,23 @@
           <a:graphicData uri="http://schemas.openxmlformats.org/presentationml/2006/ole">
             <mc:AlternateContent xmlns:mc="http://schemas.openxmlformats.org/markup-compatibility/2006">
               <mc:Choice xmlns:v="urn:schemas-microsoft-com:vml" Requires="v">
-                <p:oleObj spid="_x0000_s39358" name="Equation" r:id="rId9" imgW="3263900" imgH="914400" progId="Equation.DSMT4">
+                <p:oleObj name="Equation" r:id="rId8" imgW="3263900" imgH="914400" progId="Equation.DSMT4">
                   <p:embed/>
                 </p:oleObj>
               </mc:Choice>
               <mc:Fallback>
-                <p:oleObj name="Equation" r:id="rId9" imgW="3263900" imgH="914400" progId="Equation.DSMT4">
+                <p:oleObj name="Equation" r:id="rId8" imgW="3263900" imgH="914400" progId="Equation.DSMT4">
                   <p:embed/>
                   <p:pic>
                     <p:nvPicPr>
-                      <p:cNvPr id="0" name="图片 30795"/>
+                      <p:cNvPr id="46088" name="Object 6"/>
                       <p:cNvPicPr>
                         <a:picLocks noChangeAspect="1" noChangeArrowheads="1"/>
                       </p:cNvPicPr>
                       <p:nvPr/>
                     </p:nvPicPr>
                     <p:blipFill>
-                      <a:blip r:embed="rId10">
+                      <a:blip r:embed="rId9">
                         <a:extLst>
                           <a:ext uri="{28A0092B-C50C-407E-A947-70E740481C1C}">
                             <a14:useLocalDpi xmlns:a14="http://schemas.microsoft.com/office/drawing/2010/main" val="0"/>
@@ -9370,7 +9479,7 @@
                 <a:spcPct val="20000"/>
               </a:spcBef>
               <a:buBlip>
-                <a:blip r:embed="rId11"/>
+                <a:blip r:embed="rId10"/>
               </a:buBlip>
               <a:defRPr sz="2000">
                 <a:solidFill>
@@ -9410,7 +9519,7 @@
                 <a:spcPct val="20000"/>
               </a:spcBef>
               <a:buBlip>
-                <a:blip r:embed="rId11"/>
+                <a:blip r:embed="rId10"/>
               </a:buBlip>
               <a:defRPr sz="1400" i="1">
                 <a:solidFill>
@@ -9565,23 +9674,23 @@
           <a:graphicData uri="http://schemas.openxmlformats.org/presentationml/2006/ole">
             <mc:AlternateContent xmlns:mc="http://schemas.openxmlformats.org/markup-compatibility/2006">
               <mc:Choice xmlns:v="urn:schemas-microsoft-com:vml" Requires="v">
-                <p:oleObj spid="_x0000_s39359" name="Equation" r:id="rId12" imgW="508000" imgH="241300" progId="Equation.DSMT4">
+                <p:oleObj name="Equation" r:id="rId11" imgW="508000" imgH="241300" progId="Equation.DSMT4">
                   <p:embed/>
                 </p:oleObj>
               </mc:Choice>
               <mc:Fallback>
-                <p:oleObj name="Equation" r:id="rId12" imgW="508000" imgH="241300" progId="Equation.DSMT4">
+                <p:oleObj name="Equation" r:id="rId11" imgW="508000" imgH="241300" progId="Equation.DSMT4">
                   <p:embed/>
                   <p:pic>
                     <p:nvPicPr>
-                      <p:cNvPr id="0" name="图片 30796"/>
+                      <p:cNvPr id="46091" name="Object 11"/>
                       <p:cNvPicPr>
                         <a:picLocks noChangeAspect="1" noChangeArrowheads="1"/>
                       </p:cNvPicPr>
                       <p:nvPr/>
                     </p:nvPicPr>
                     <p:blipFill>
-                      <a:blip r:embed="rId13">
+                      <a:blip r:embed="rId12">
                         <a:extLst>
                           <a:ext uri="{28A0092B-C50C-407E-A947-70E740481C1C}">
                             <a14:useLocalDpi xmlns:a14="http://schemas.microsoft.com/office/drawing/2010/main" val="0"/>
@@ -9682,7 +9791,7 @@
                 <a:spcPct val="20000"/>
               </a:spcBef>
               <a:buBlip>
-                <a:blip r:embed="rId11"/>
+                <a:blip r:embed="rId10"/>
               </a:buBlip>
               <a:defRPr sz="2000">
                 <a:solidFill>
@@ -9722,7 +9831,7 @@
                 <a:spcPct val="20000"/>
               </a:spcBef>
               <a:buBlip>
-                <a:blip r:embed="rId11"/>
+                <a:blip r:embed="rId10"/>
               </a:buBlip>
               <a:defRPr sz="1400" i="1">
                 <a:solidFill>
@@ -9883,7 +9992,7 @@
                 <a:spcPct val="20000"/>
               </a:spcBef>
               <a:buBlip>
-                <a:blip r:embed="rId11"/>
+                <a:blip r:embed="rId10"/>
               </a:buBlip>
               <a:defRPr sz="2000">
                 <a:solidFill>
@@ -9923,7 +10032,7 @@
                 <a:spcPct val="20000"/>
               </a:spcBef>
               <a:buBlip>
-                <a:blip r:embed="rId11"/>
+                <a:blip r:embed="rId10"/>
               </a:buBlip>
               <a:defRPr sz="1400" i="1">
                 <a:solidFill>
@@ -10084,7 +10193,7 @@
                 <a:spcPct val="0"/>
               </a:spcAft>
               <a:buBlip>
-                <a:blip r:embed="rId11"/>
+                <a:blip r:embed="rId10"/>
               </a:buBlip>
               <a:defRPr sz="2000">
                 <a:solidFill>
@@ -10135,7 +10244,7 @@
                 <a:spcPct val="0"/>
               </a:spcAft>
               <a:buBlip>
-                <a:blip r:embed="rId11"/>
+                <a:blip r:embed="rId10"/>
               </a:buBlip>
               <a:defRPr sz="1400" i="1">
                 <a:solidFill>
@@ -10319,7 +10428,7 @@
                 <a:spcPct val="20000"/>
               </a:spcBef>
               <a:buBlip>
-                <a:blip r:embed="rId11"/>
+                <a:blip r:embed="rId10"/>
               </a:buBlip>
               <a:defRPr sz="2000">
                 <a:solidFill>
@@ -10359,7 +10468,7 @@
                 <a:spcPct val="20000"/>
               </a:spcBef>
               <a:buBlip>
-                <a:blip r:embed="rId11"/>
+                <a:blip r:embed="rId10"/>
               </a:buBlip>
               <a:defRPr sz="1400" i="1">
                 <a:solidFill>
@@ -10470,7 +10579,7 @@
           <p:nvPr/>
         </p:nvPicPr>
         <p:blipFill>
-          <a:blip r:embed="rId14" cstate="print">
+          <a:blip r:embed="rId13" cstate="print">
             <a:extLst>
               <a:ext uri="{28A0092B-C50C-407E-A947-70E740481C1C}">
                 <a14:useLocalDpi xmlns:a14="http://schemas.microsoft.com/office/drawing/2010/main" val="0"/>
@@ -10504,7 +10613,7 @@
       </p:pic>
     </p:spTree>
     <p:custDataLst>
-      <p:tags r:id="rId2"/>
+      <p:tags r:id="rId1"/>
     </p:custDataLst>
   </p:cSld>
   <p:clrMapOvr>
@@ -10553,23 +10662,23 @@
           <a:graphicData uri="http://schemas.openxmlformats.org/presentationml/2006/ole">
             <mc:AlternateContent xmlns:mc="http://schemas.openxmlformats.org/markup-compatibility/2006">
               <mc:Choice xmlns:v="urn:schemas-microsoft-com:vml" Requires="v">
-                <p:oleObj spid="_x0000_s40053" name="Equation" r:id="rId4" imgW="901700" imgH="736600" progId="Equation.3">
+                <p:oleObj name="Equation" r:id="rId3" imgW="901700" imgH="736600" progId="Equation.3">
                   <p:embed/>
                 </p:oleObj>
               </mc:Choice>
               <mc:Fallback>
-                <p:oleObj name="Equation" r:id="rId4" imgW="901700" imgH="736600" progId="Equation.3">
+                <p:oleObj name="Equation" r:id="rId3" imgW="901700" imgH="736600" progId="Equation.3">
                   <p:embed/>
                   <p:pic>
                     <p:nvPicPr>
-                      <p:cNvPr id="0" name="图片 27800"/>
+                      <p:cNvPr id="13" name="Object 38"/>
                       <p:cNvPicPr>
                         <a:picLocks noChangeAspect="1" noChangeArrowheads="1"/>
                       </p:cNvPicPr>
                       <p:nvPr/>
                     </p:nvPicPr>
                     <p:blipFill>
-                      <a:blip r:embed="rId5"/>
+                      <a:blip r:embed="rId4"/>
                       <a:srcRect/>
                       <a:stretch>
                         <a:fillRect/>
@@ -10781,7 +10890,7 @@
           <p:nvPr/>
         </p:nvPicPr>
         <p:blipFill>
-          <a:blip r:embed="rId6" cstate="print">
+          <a:blip r:embed="rId5" cstate="print">
             <a:extLst>
               <a:ext uri="{28A0092B-C50C-407E-A947-70E740481C1C}">
                 <a14:useLocalDpi xmlns:a14="http://schemas.microsoft.com/office/drawing/2010/main" val="0"/>
@@ -10876,7 +10985,7 @@
                 <a:spcPct val="20000"/>
               </a:spcBef>
               <a:buBlip>
-                <a:blip r:embed="rId7"/>
+                <a:blip r:embed="rId6"/>
               </a:buBlip>
               <a:defRPr sz="2000">
                 <a:solidFill>
@@ -10916,7 +11025,7 @@
                 <a:spcPct val="20000"/>
               </a:spcBef>
               <a:buBlip>
-                <a:blip r:embed="rId7"/>
+                <a:blip r:embed="rId6"/>
               </a:buBlip>
               <a:defRPr sz="1400" i="1">
                 <a:solidFill>
@@ -11077,7 +11186,7 @@
                 <a:spcPct val="20000"/>
               </a:spcBef>
               <a:buBlip>
-                <a:blip r:embed="rId7"/>
+                <a:blip r:embed="rId6"/>
               </a:buBlip>
               <a:defRPr sz="2000">
                 <a:solidFill>
@@ -11117,7 +11226,7 @@
                 <a:spcPct val="20000"/>
               </a:spcBef>
               <a:buBlip>
-                <a:blip r:embed="rId7"/>
+                <a:blip r:embed="rId6"/>
               </a:buBlip>
               <a:defRPr sz="1400" i="1">
                 <a:solidFill>
@@ -11278,7 +11387,7 @@
                 <a:spcPct val="0"/>
               </a:spcAft>
               <a:buBlip>
-                <a:blip r:embed="rId7"/>
+                <a:blip r:embed="rId6"/>
               </a:buBlip>
               <a:defRPr sz="2000">
                 <a:solidFill>
@@ -11329,7 +11438,7 @@
                 <a:spcPct val="0"/>
               </a:spcAft>
               <a:buBlip>
-                <a:blip r:embed="rId7"/>
+                <a:blip r:embed="rId6"/>
               </a:buBlip>
               <a:defRPr sz="1400" i="1">
                 <a:solidFill>
@@ -11476,7 +11585,7 @@
           <p:nvPr/>
         </p:nvPicPr>
         <p:blipFill>
-          <a:blip r:embed="rId8">
+          <a:blip r:embed="rId7">
             <a:extLst>
               <a:ext uri="{28A0092B-C50C-407E-A947-70E740481C1C}">
                 <a14:useLocalDpi xmlns:a14="http://schemas.microsoft.com/office/drawing/2010/main" val="0"/>
@@ -11510,7 +11619,7 @@
       </p:pic>
     </p:spTree>
     <p:custDataLst>
-      <p:tags r:id="rId2"/>
+      <p:tags r:id="rId1"/>
     </p:custDataLst>
   </p:cSld>
   <p:clrMapOvr>
@@ -11546,7 +11655,7 @@
           <p:nvPr/>
         </p:nvPicPr>
         <p:blipFill>
-          <a:blip r:embed="rId4">
+          <a:blip r:embed="rId3">
             <a:extLst>
               <a:ext uri="{28A0092B-C50C-407E-A947-70E740481C1C}">
                 <a14:useLocalDpi xmlns:a14="http://schemas.microsoft.com/office/drawing/2010/main" val="0"/>
@@ -11607,23 +11716,23 @@
           <a:graphicData uri="http://schemas.openxmlformats.org/presentationml/2006/ole">
             <mc:AlternateContent xmlns:mc="http://schemas.openxmlformats.org/markup-compatibility/2006">
               <mc:Choice xmlns:v="urn:schemas-microsoft-com:vml" Requires="v">
-                <p:oleObj spid="_x0000_s41289" name="Equation" r:id="rId5" imgW="990600" imgH="228600" progId="Equation.DSMT4">
+                <p:oleObj name="Equation" r:id="rId4" imgW="990600" imgH="228600" progId="Equation.DSMT4">
                   <p:embed/>
                 </p:oleObj>
               </mc:Choice>
               <mc:Fallback>
-                <p:oleObj name="Equation" r:id="rId5" imgW="990600" imgH="228600" progId="Equation.DSMT4">
+                <p:oleObj name="Equation" r:id="rId4" imgW="990600" imgH="228600" progId="Equation.DSMT4">
                   <p:embed/>
                   <p:pic>
                     <p:nvPicPr>
-                      <p:cNvPr id="0" name="图片 32824"/>
+                      <p:cNvPr id="48135" name="Object 4"/>
                       <p:cNvPicPr>
                         <a:picLocks noChangeAspect="1" noChangeArrowheads="1"/>
                       </p:cNvPicPr>
                       <p:nvPr/>
                     </p:nvPicPr>
                     <p:blipFill>
-                      <a:blip r:embed="rId6"/>
+                      <a:blip r:embed="rId5"/>
                       <a:srcRect/>
                       <a:stretch>
                         <a:fillRect/>
@@ -11717,7 +11826,7 @@
                 <a:spcPct val="20000"/>
               </a:spcBef>
               <a:buBlip>
-                <a:blip r:embed="rId7"/>
+                <a:blip r:embed="rId6"/>
               </a:buBlip>
               <a:defRPr sz="2000">
                 <a:solidFill>
@@ -11757,7 +11866,7 @@
                 <a:spcPct val="20000"/>
               </a:spcBef>
               <a:buBlip>
-                <a:blip r:embed="rId7"/>
+                <a:blip r:embed="rId6"/>
               </a:buBlip>
               <a:defRPr sz="1400" i="1">
                 <a:solidFill>
@@ -11881,23 +11990,23 @@
           <a:graphicData uri="http://schemas.openxmlformats.org/presentationml/2006/ole">
             <mc:AlternateContent xmlns:mc="http://schemas.openxmlformats.org/markup-compatibility/2006">
               <mc:Choice xmlns:v="urn:schemas-microsoft-com:vml" Requires="v">
-                <p:oleObj spid="_x0000_s41290" name="Equation" r:id="rId8" imgW="990600" imgH="228600" progId="Equation.DSMT4">
+                <p:oleObj name="Equation" r:id="rId7" imgW="990600" imgH="228600" progId="Equation.DSMT4">
                   <p:embed/>
                 </p:oleObj>
               </mc:Choice>
               <mc:Fallback>
-                <p:oleObj name="Equation" r:id="rId8" imgW="990600" imgH="228600" progId="Equation.DSMT4">
+                <p:oleObj name="Equation" r:id="rId7" imgW="990600" imgH="228600" progId="Equation.DSMT4">
                   <p:embed/>
                   <p:pic>
                     <p:nvPicPr>
-                      <p:cNvPr id="0" name="图片 32825"/>
+                      <p:cNvPr id="48141" name="Object 6"/>
                       <p:cNvPicPr>
                         <a:picLocks noChangeAspect="1" noChangeArrowheads="1"/>
                       </p:cNvPicPr>
                       <p:nvPr/>
                     </p:nvPicPr>
                     <p:blipFill>
-                      <a:blip r:embed="rId9">
+                      <a:blip r:embed="rId8">
                         <a:extLst>
                           <a:ext uri="{28A0092B-C50C-407E-A947-70E740481C1C}">
                             <a14:useLocalDpi xmlns:a14="http://schemas.microsoft.com/office/drawing/2010/main" val="0"/>
@@ -12127,23 +12236,23 @@
           <a:graphicData uri="http://schemas.openxmlformats.org/presentationml/2006/ole">
             <mc:AlternateContent xmlns:mc="http://schemas.openxmlformats.org/markup-compatibility/2006">
               <mc:Choice xmlns:v="urn:schemas-microsoft-com:vml" Requires="v">
-                <p:oleObj spid="_x0000_s41291" name="Equation" r:id="rId10" imgW="215900" imgH="228600" progId="Equation.3">
+                <p:oleObj name="Equation" r:id="rId9" imgW="215900" imgH="228600" progId="Equation.3">
                   <p:embed/>
                 </p:oleObj>
               </mc:Choice>
               <mc:Fallback>
-                <p:oleObj name="Equation" r:id="rId10" imgW="215900" imgH="228600" progId="Equation.3">
+                <p:oleObj name="Equation" r:id="rId9" imgW="215900" imgH="228600" progId="Equation.3">
                   <p:embed/>
                   <p:pic>
                     <p:nvPicPr>
-                      <p:cNvPr id="0" name="图片 27800"/>
+                      <p:cNvPr id="13" name="Object 38"/>
                       <p:cNvPicPr>
                         <a:picLocks noChangeAspect="1" noChangeArrowheads="1"/>
                       </p:cNvPicPr>
                       <p:nvPr/>
                     </p:nvPicPr>
                     <p:blipFill>
-                      <a:blip r:embed="rId11"/>
+                      <a:blip r:embed="rId10"/>
                       <a:srcRect/>
                       <a:stretch>
                         <a:fillRect/>
@@ -12238,7 +12347,7 @@
                 <a:spcPct val="20000"/>
               </a:spcBef>
               <a:buBlip>
-                <a:blip r:embed="rId7"/>
+                <a:blip r:embed="rId6"/>
               </a:buBlip>
               <a:defRPr sz="2000">
                 <a:solidFill>
@@ -12278,7 +12387,7 @@
                 <a:spcPct val="20000"/>
               </a:spcBef>
               <a:buBlip>
-                <a:blip r:embed="rId7"/>
+                <a:blip r:embed="rId6"/>
               </a:buBlip>
               <a:defRPr sz="1400" i="1">
                 <a:solidFill>
@@ -12439,7 +12548,7 @@
                 <a:spcPct val="20000"/>
               </a:spcBef>
               <a:buBlip>
-                <a:blip r:embed="rId7"/>
+                <a:blip r:embed="rId6"/>
               </a:buBlip>
               <a:defRPr sz="2000">
                 <a:solidFill>
@@ -12479,7 +12588,7 @@
                 <a:spcPct val="20000"/>
               </a:spcBef>
               <a:buBlip>
-                <a:blip r:embed="rId7"/>
+                <a:blip r:embed="rId6"/>
               </a:buBlip>
               <a:defRPr sz="1400" i="1">
                 <a:solidFill>
@@ -12640,7 +12749,7 @@
                 <a:spcPct val="0"/>
               </a:spcAft>
               <a:buBlip>
-                <a:blip r:embed="rId7"/>
+                <a:blip r:embed="rId6"/>
               </a:buBlip>
               <a:defRPr sz="2000">
                 <a:solidFill>
@@ -12691,7 +12800,7 @@
                 <a:spcPct val="0"/>
               </a:spcAft>
               <a:buBlip>
-                <a:blip r:embed="rId7"/>
+                <a:blip r:embed="rId6"/>
               </a:buBlip>
               <a:defRPr sz="1400" i="1">
                 <a:solidFill>
@@ -12847,7 +12956,7 @@
       </p:sp>
     </p:spTree>
     <p:custDataLst>
-      <p:tags r:id="rId2"/>
+      <p:tags r:id="rId1"/>
     </p:custDataLst>
   </p:cSld>
   <p:clrMapOvr>
@@ -12896,23 +13005,23 @@
           <a:graphicData uri="http://schemas.openxmlformats.org/presentationml/2006/ole">
             <mc:AlternateContent xmlns:mc="http://schemas.openxmlformats.org/markup-compatibility/2006">
               <mc:Choice xmlns:v="urn:schemas-microsoft-com:vml" Requires="v">
-                <p:oleObj spid="_x0000_s42220" name="Equation" r:id="rId4" imgW="1790640" imgH="660240" progId="Equation.DSMT4">
+                <p:oleObj name="Equation" r:id="rId3" imgW="1790640" imgH="660240" progId="Equation.DSMT4">
                   <p:embed/>
                 </p:oleObj>
               </mc:Choice>
               <mc:Fallback>
-                <p:oleObj name="Equation" r:id="rId4" imgW="1790640" imgH="660240" progId="Equation.DSMT4">
+                <p:oleObj name="Equation" r:id="rId3" imgW="1790640" imgH="660240" progId="Equation.DSMT4">
                   <p:embed/>
                   <p:pic>
                     <p:nvPicPr>
-                      <p:cNvPr id="0" name="图片 33811"/>
+                      <p:cNvPr id="49157" name="Object 3"/>
                       <p:cNvPicPr>
                         <a:picLocks noChangeAspect="1" noChangeArrowheads="1"/>
                       </p:cNvPicPr>
                       <p:nvPr/>
                     </p:nvPicPr>
                     <p:blipFill>
-                      <a:blip r:embed="rId5"/>
+                      <a:blip r:embed="rId4"/>
                       <a:srcRect/>
                       <a:stretch>
                         <a:fillRect/>
@@ -13007,7 +13116,7 @@
                 <a:spcPct val="20000"/>
               </a:spcBef>
               <a:buBlip>
-                <a:blip r:embed="rId6"/>
+                <a:blip r:embed="rId5"/>
               </a:buBlip>
               <a:defRPr sz="2000">
                 <a:solidFill>
@@ -13047,7 +13156,7 @@
                 <a:spcPct val="20000"/>
               </a:spcBef>
               <a:buBlip>
-                <a:blip r:embed="rId6"/>
+                <a:blip r:embed="rId5"/>
               </a:buBlip>
               <a:defRPr sz="1400" i="1">
                 <a:solidFill>
@@ -13208,7 +13317,7 @@
                 <a:spcPct val="20000"/>
               </a:spcBef>
               <a:buBlip>
-                <a:blip r:embed="rId6"/>
+                <a:blip r:embed="rId5"/>
               </a:buBlip>
               <a:defRPr sz="2000">
                 <a:solidFill>
@@ -13248,7 +13357,7 @@
                 <a:spcPct val="20000"/>
               </a:spcBef>
               <a:buBlip>
-                <a:blip r:embed="rId6"/>
+                <a:blip r:embed="rId5"/>
               </a:buBlip>
               <a:defRPr sz="1400" i="1">
                 <a:solidFill>
@@ -13409,7 +13518,7 @@
                 <a:spcPct val="0"/>
               </a:spcAft>
               <a:buBlip>
-                <a:blip r:embed="rId6"/>
+                <a:blip r:embed="rId5"/>
               </a:buBlip>
               <a:defRPr sz="2000">
                 <a:solidFill>
@@ -13460,7 +13569,7 @@
                 <a:spcPct val="0"/>
               </a:spcAft>
               <a:buBlip>
-                <a:blip r:embed="rId6"/>
+                <a:blip r:embed="rId5"/>
               </a:buBlip>
               <a:defRPr sz="1400" i="1">
                 <a:solidFill>
@@ -13607,7 +13716,7 @@
           <p:nvPr/>
         </p:nvPicPr>
         <p:blipFill>
-          <a:blip r:embed="rId7">
+          <a:blip r:embed="rId6">
             <a:extLst>
               <a:ext uri="{28A0092B-C50C-407E-A947-70E740481C1C}">
                 <a14:useLocalDpi xmlns:a14="http://schemas.microsoft.com/office/drawing/2010/main" val="0"/>
@@ -13702,7 +13811,7 @@
                   <a:spcPct val="20000"/>
                 </a:spcBef>
                 <a:buBlip>
-                  <a:blip r:embed="rId6"/>
+                  <a:blip r:embed="rId5"/>
                 </a:buBlip>
                 <a:defRPr sz="2000">
                   <a:solidFill>
@@ -13742,7 +13851,7 @@
                   <a:spcPct val="20000"/>
                 </a:spcBef>
                 <a:buBlip>
-                  <a:blip r:embed="rId6"/>
+                  <a:blip r:embed="rId5"/>
                 </a:buBlip>
                 <a:defRPr sz="1400" i="1">
                   <a:solidFill>
@@ -13853,7 +13962,7 @@
             <p:nvPr/>
           </p:nvPicPr>
           <p:blipFill>
-            <a:blip r:embed="rId8">
+            <a:blip r:embed="rId7">
               <a:extLst>
                 <a:ext uri="{28A0092B-C50C-407E-A947-70E740481C1C}">
                   <a14:useLocalDpi xmlns:a14="http://schemas.microsoft.com/office/drawing/2010/main" val="0"/>
@@ -13920,21 +14029,21 @@
             <a:graphicData uri="http://schemas.openxmlformats.org/presentationml/2006/ole">
               <mc:AlternateContent xmlns:mc="http://schemas.openxmlformats.org/markup-compatibility/2006">
                 <mc:Choice xmlns:v="urn:schemas-microsoft-com:vml" Requires="v">
-                  <p:oleObj spid="_x0000_s42221" name="Equation" r:id="rId9" imgW="164880" imgH="190440" progId="Equation.DSMT4">
+                  <p:oleObj name="Equation" r:id="rId8" imgW="164880" imgH="190440" progId="Equation.DSMT4">
                     <p:embed/>
                   </p:oleObj>
                 </mc:Choice>
                 <mc:Fallback>
-                  <p:oleObj name="Equation" r:id="rId9" imgW="164880" imgH="190440" progId="Equation.DSMT4">
+                  <p:oleObj name="Equation" r:id="rId8" imgW="164880" imgH="190440" progId="Equation.DSMT4">
                     <p:embed/>
                     <p:pic>
                       <p:nvPicPr>
-                        <p:cNvPr id="3" name="对象 2"/>
+                        <p:cNvPr id="16" name="对象 15"/>
                         <p:cNvPicPr/>
                         <p:nvPr/>
                       </p:nvPicPr>
                       <p:blipFill>
-                        <a:blip r:embed="rId10"/>
+                        <a:blip r:embed="rId9"/>
                         <a:stretch>
                           <a:fillRect/>
                         </a:stretch>
@@ -13996,7 +14105,7 @@
               <p:nvPr/>
             </p:nvPicPr>
             <p:blipFill>
-              <a:blip r:embed="rId11">
+              <a:blip r:embed="rId10">
                 <a:extLst>
                   <a:ext uri="{28A0092B-C50C-407E-A947-70E740481C1C}">
                     <a14:useLocalDpi xmlns:a14="http://schemas.microsoft.com/office/drawing/2010/main" val="0"/>
@@ -14120,21 +14229,21 @@
               <a:graphicData uri="http://schemas.openxmlformats.org/presentationml/2006/ole">
                 <mc:AlternateContent xmlns:mc="http://schemas.openxmlformats.org/markup-compatibility/2006">
                   <mc:Choice xmlns:v="urn:schemas-microsoft-com:vml" Requires="v">
-                    <p:oleObj spid="_x0000_s42222" name="Equation" r:id="rId12" imgW="164880" imgH="190440" progId="Equation.DSMT4">
+                    <p:oleObj name="Equation" r:id="rId11" imgW="164880" imgH="190440" progId="Equation.DSMT4">
                       <p:embed/>
                     </p:oleObj>
                   </mc:Choice>
                   <mc:Fallback>
-                    <p:oleObj name="Equation" r:id="rId12" imgW="164880" imgH="190440" progId="Equation.DSMT4">
+                    <p:oleObj name="Equation" r:id="rId11" imgW="164880" imgH="190440" progId="Equation.DSMT4">
                       <p:embed/>
                       <p:pic>
                         <p:nvPicPr>
-                          <p:cNvPr id="0" name=""/>
+                          <p:cNvPr id="3" name="对象 2"/>
                           <p:cNvPicPr/>
                           <p:nvPr/>
                         </p:nvPicPr>
                         <p:blipFill>
-                          <a:blip r:embed="rId10"/>
+                          <a:blip r:embed="rId9"/>
                           <a:stretch>
                             <a:fillRect/>
                           </a:stretch>
@@ -14181,21 +14290,21 @@
             <a:graphicData uri="http://schemas.openxmlformats.org/presentationml/2006/ole">
               <mc:AlternateContent xmlns:mc="http://schemas.openxmlformats.org/markup-compatibility/2006">
                 <mc:Choice xmlns:v="urn:schemas-microsoft-com:vml" Requires="v">
-                  <p:oleObj spid="_x0000_s42223" name="Equation" r:id="rId13" imgW="266400" imgH="139680" progId="Equation.DSMT4">
+                  <p:oleObj name="Equation" r:id="rId12" imgW="266400" imgH="139680" progId="Equation.DSMT4">
                     <p:embed/>
                   </p:oleObj>
                 </mc:Choice>
                 <mc:Fallback>
-                  <p:oleObj name="Equation" r:id="rId13" imgW="266400" imgH="139680" progId="Equation.DSMT4">
+                  <p:oleObj name="Equation" r:id="rId12" imgW="266400" imgH="139680" progId="Equation.DSMT4">
                     <p:embed/>
                     <p:pic>
                       <p:nvPicPr>
-                        <p:cNvPr id="16" name="对象 15"/>
+                        <p:cNvPr id="17" name="对象 16"/>
                         <p:cNvPicPr/>
                         <p:nvPr/>
                       </p:nvPicPr>
                       <p:blipFill>
-                        <a:blip r:embed="rId14"/>
+                        <a:blip r:embed="rId13"/>
                         <a:stretch>
                           <a:fillRect/>
                         </a:stretch>
@@ -14222,7 +14331,7 @@
       </p:grpSp>
     </p:spTree>
     <p:custDataLst>
-      <p:tags r:id="rId2"/>
+      <p:tags r:id="rId1"/>
     </p:custDataLst>
   </p:cSld>
   <p:clrMapOvr>
@@ -14479,7 +14588,7 @@
                 <a:spcPct val="20000"/>
               </a:spcBef>
               <a:buBlip>
-                <a:blip r:embed="rId4"/>
+                <a:blip r:embed="rId3"/>
               </a:buBlip>
               <a:defRPr sz="2000">
                 <a:solidFill>
@@ -14519,7 +14628,7 @@
                 <a:spcPct val="20000"/>
               </a:spcBef>
               <a:buBlip>
-                <a:blip r:embed="rId4"/>
+                <a:blip r:embed="rId3"/>
               </a:buBlip>
               <a:defRPr sz="1400" i="1">
                 <a:solidFill>
@@ -14643,23 +14752,23 @@
           <a:graphicData uri="http://schemas.openxmlformats.org/presentationml/2006/ole">
             <mc:AlternateContent xmlns:mc="http://schemas.openxmlformats.org/markup-compatibility/2006">
               <mc:Choice xmlns:v="urn:schemas-microsoft-com:vml" Requires="v">
-                <p:oleObj spid="_x0000_s43943" name="Equation" r:id="rId5" imgW="215900" imgH="190500" progId="Equation.3">
+                <p:oleObj name="Equation" r:id="rId4" imgW="215900" imgH="190500" progId="Equation.3">
                   <p:embed/>
                 </p:oleObj>
               </mc:Choice>
               <mc:Fallback>
-                <p:oleObj name="Equation" r:id="rId5" imgW="215900" imgH="190500" progId="Equation.3">
+                <p:oleObj name="Equation" r:id="rId4" imgW="215900" imgH="190500" progId="Equation.3">
                   <p:embed/>
                   <p:pic>
                     <p:nvPicPr>
-                      <p:cNvPr id="0" name="图片 27800"/>
+                      <p:cNvPr id="13" name="Object 38"/>
                       <p:cNvPicPr>
                         <a:picLocks noChangeAspect="1" noChangeArrowheads="1"/>
                       </p:cNvPicPr>
                       <p:nvPr/>
                     </p:nvPicPr>
                     <p:blipFill>
-                      <a:blip r:embed="rId6"/>
+                      <a:blip r:embed="rId5"/>
                       <a:srcRect/>
                       <a:stretch>
                         <a:fillRect/>
@@ -14707,23 +14816,23 @@
           <a:graphicData uri="http://schemas.openxmlformats.org/presentationml/2006/ole">
             <mc:AlternateContent xmlns:mc="http://schemas.openxmlformats.org/markup-compatibility/2006">
               <mc:Choice xmlns:v="urn:schemas-microsoft-com:vml" Requires="v">
-                <p:oleObj spid="_x0000_s43944" name="Equation" r:id="rId7" imgW="215900" imgH="190500" progId="Equation.3">
+                <p:oleObj name="Equation" r:id="rId6" imgW="215900" imgH="190500" progId="Equation.3">
                   <p:embed/>
                 </p:oleObj>
               </mc:Choice>
               <mc:Fallback>
-                <p:oleObj name="Equation" r:id="rId7" imgW="215900" imgH="190500" progId="Equation.3">
+                <p:oleObj name="Equation" r:id="rId6" imgW="215900" imgH="190500" progId="Equation.3">
                   <p:embed/>
                   <p:pic>
                     <p:nvPicPr>
-                      <p:cNvPr id="0" name="图片 27800"/>
+                      <p:cNvPr id="6" name="Object 38"/>
                       <p:cNvPicPr>
                         <a:picLocks noChangeAspect="1" noChangeArrowheads="1"/>
                       </p:cNvPicPr>
                       <p:nvPr/>
                     </p:nvPicPr>
                     <p:blipFill>
-                      <a:blip r:embed="rId6"/>
+                      <a:blip r:embed="rId5"/>
                       <a:srcRect/>
                       <a:stretch>
                         <a:fillRect/>
@@ -14771,23 +14880,23 @@
           <a:graphicData uri="http://schemas.openxmlformats.org/presentationml/2006/ole">
             <mc:AlternateContent xmlns:mc="http://schemas.openxmlformats.org/markup-compatibility/2006">
               <mc:Choice xmlns:v="urn:schemas-microsoft-com:vml" Requires="v">
-                <p:oleObj spid="_x0000_s43945" name="Equation" r:id="rId8" imgW="1726920" imgH="241200" progId="Equation.DSMT4">
+                <p:oleObj name="Equation" r:id="rId7" imgW="1726920" imgH="241200" progId="Equation.DSMT4">
                   <p:embed/>
                 </p:oleObj>
               </mc:Choice>
               <mc:Fallback>
-                <p:oleObj name="Equation" r:id="rId8" imgW="1726920" imgH="241200" progId="Equation.DSMT4">
+                <p:oleObj name="Equation" r:id="rId7" imgW="1726920" imgH="241200" progId="Equation.DSMT4">
                   <p:embed/>
                   <p:pic>
                     <p:nvPicPr>
-                      <p:cNvPr id="0" name="图片 34944"/>
+                      <p:cNvPr id="50183" name="Object 3"/>
                       <p:cNvPicPr>
                         <a:picLocks noChangeAspect="1" noChangeArrowheads="1"/>
                       </p:cNvPicPr>
                       <p:nvPr/>
                     </p:nvPicPr>
                     <p:blipFill>
-                      <a:blip r:embed="rId9"/>
+                      <a:blip r:embed="rId8"/>
                       <a:srcRect/>
                       <a:stretch>
                         <a:fillRect/>
@@ -14835,23 +14944,23 @@
           <a:graphicData uri="http://schemas.openxmlformats.org/presentationml/2006/ole">
             <mc:AlternateContent xmlns:mc="http://schemas.openxmlformats.org/markup-compatibility/2006">
               <mc:Choice xmlns:v="urn:schemas-microsoft-com:vml" Requires="v">
-                <p:oleObj spid="_x0000_s43946" name="Equation" r:id="rId10" imgW="1422360" imgH="228600" progId="Equation.DSMT4">
+                <p:oleObj name="Equation" r:id="rId9" imgW="1422360" imgH="228600" progId="Equation.DSMT4">
                   <p:embed/>
                 </p:oleObj>
               </mc:Choice>
               <mc:Fallback>
-                <p:oleObj name="Equation" r:id="rId10" imgW="1422360" imgH="228600" progId="Equation.DSMT4">
+                <p:oleObj name="Equation" r:id="rId9" imgW="1422360" imgH="228600" progId="Equation.DSMT4">
                   <p:embed/>
                   <p:pic>
                     <p:nvPicPr>
-                      <p:cNvPr id="0" name="图片 34946"/>
+                      <p:cNvPr id="50186" name="Object 7"/>
                       <p:cNvPicPr>
                         <a:picLocks noChangeAspect="1" noChangeArrowheads="1"/>
                       </p:cNvPicPr>
                       <p:nvPr/>
                     </p:nvPicPr>
                     <p:blipFill>
-                      <a:blip r:embed="rId11"/>
+                      <a:blip r:embed="rId10"/>
                       <a:srcRect/>
                       <a:stretch>
                         <a:fillRect/>
@@ -14899,23 +15008,23 @@
           <a:graphicData uri="http://schemas.openxmlformats.org/presentationml/2006/ole">
             <mc:AlternateContent xmlns:mc="http://schemas.openxmlformats.org/markup-compatibility/2006">
               <mc:Choice xmlns:v="urn:schemas-microsoft-com:vml" Requires="v">
-                <p:oleObj spid="_x0000_s43947" name="Equation" r:id="rId12" imgW="1739880" imgH="228600" progId="Equation.DSMT4">
+                <p:oleObj name="Equation" r:id="rId11" imgW="1739880" imgH="228600" progId="Equation.DSMT4">
                   <p:embed/>
                 </p:oleObj>
               </mc:Choice>
               <mc:Fallback>
-                <p:oleObj name="Equation" r:id="rId12" imgW="1739880" imgH="228600" progId="Equation.DSMT4">
+                <p:oleObj name="Equation" r:id="rId11" imgW="1739880" imgH="228600" progId="Equation.DSMT4">
                   <p:embed/>
                   <p:pic>
                     <p:nvPicPr>
-                      <p:cNvPr id="0" name="图片 34947"/>
+                      <p:cNvPr id="50187" name="Object 8"/>
                       <p:cNvPicPr>
                         <a:picLocks noChangeAspect="1" noChangeArrowheads="1"/>
                       </p:cNvPicPr>
                       <p:nvPr/>
                     </p:nvPicPr>
                     <p:blipFill>
-                      <a:blip r:embed="rId13"/>
+                      <a:blip r:embed="rId12"/>
                       <a:srcRect/>
                       <a:stretch>
                         <a:fillRect/>
@@ -14963,23 +15072,23 @@
           <a:graphicData uri="http://schemas.openxmlformats.org/presentationml/2006/ole">
             <mc:AlternateContent xmlns:mc="http://schemas.openxmlformats.org/markup-compatibility/2006">
               <mc:Choice xmlns:v="urn:schemas-microsoft-com:vml" Requires="v">
-                <p:oleObj spid="_x0000_s43948" name="Equation" r:id="rId14" imgW="1116965" imgH="254000" progId="Equation.DSMT4">
+                <p:oleObj name="Equation" r:id="rId13" imgW="1116965" imgH="254000" progId="Equation.DSMT4">
                   <p:embed/>
                 </p:oleObj>
               </mc:Choice>
               <mc:Fallback>
-                <p:oleObj name="Equation" r:id="rId14" imgW="1116965" imgH="254000" progId="Equation.DSMT4">
+                <p:oleObj name="Equation" r:id="rId13" imgW="1116965" imgH="254000" progId="Equation.DSMT4">
                   <p:embed/>
                   <p:pic>
                     <p:nvPicPr>
-                      <p:cNvPr id="0" name="图片 34948"/>
+                      <p:cNvPr id="9" name="Object 9"/>
                       <p:cNvPicPr>
                         <a:picLocks noChangeAspect="1" noChangeArrowheads="1"/>
                       </p:cNvPicPr>
                       <p:nvPr/>
                     </p:nvPicPr>
                     <p:blipFill>
-                      <a:blip r:embed="rId15">
+                      <a:blip r:embed="rId14">
                         <a:extLst>
                           <a:ext uri="{28A0092B-C50C-407E-A947-70E740481C1C}">
                             <a14:useLocalDpi xmlns:a14="http://schemas.microsoft.com/office/drawing/2010/main" val="0"/>
@@ -15033,23 +15142,23 @@
           <a:graphicData uri="http://schemas.openxmlformats.org/presentationml/2006/ole">
             <mc:AlternateContent xmlns:mc="http://schemas.openxmlformats.org/markup-compatibility/2006">
               <mc:Choice xmlns:v="urn:schemas-microsoft-com:vml" Requires="v">
-                <p:oleObj spid="_x0000_s43949" name="Equation" r:id="rId16" imgW="1257300" imgH="711200" progId="Equation.DSMT4">
+                <p:oleObj name="Equation" r:id="rId15" imgW="1257300" imgH="711200" progId="Equation.DSMT4">
                   <p:embed/>
                 </p:oleObj>
               </mc:Choice>
               <mc:Fallback>
-                <p:oleObj name="Equation" r:id="rId16" imgW="1257300" imgH="711200" progId="Equation.DSMT4">
+                <p:oleObj name="Equation" r:id="rId15" imgW="1257300" imgH="711200" progId="Equation.DSMT4">
                   <p:embed/>
                   <p:pic>
                     <p:nvPicPr>
-                      <p:cNvPr id="0" name="图片 34949"/>
+                      <p:cNvPr id="11" name="Object 10"/>
                       <p:cNvPicPr>
                         <a:picLocks noChangeAspect="1" noChangeArrowheads="1"/>
                       </p:cNvPicPr>
                       <p:nvPr/>
                     </p:nvPicPr>
                     <p:blipFill>
-                      <a:blip r:embed="rId17">
+                      <a:blip r:embed="rId16">
                         <a:extLst>
                           <a:ext uri="{28A0092B-C50C-407E-A947-70E740481C1C}">
                             <a14:useLocalDpi xmlns:a14="http://schemas.microsoft.com/office/drawing/2010/main" val="0"/>
@@ -15288,7 +15397,7 @@
                 <a:spcPct val="20000"/>
               </a:spcBef>
               <a:buBlip>
-                <a:blip r:embed="rId4"/>
+                <a:blip r:embed="rId3"/>
               </a:buBlip>
               <a:defRPr sz="2000">
                 <a:solidFill>
@@ -15328,7 +15437,7 @@
                 <a:spcPct val="20000"/>
               </a:spcBef>
               <a:buBlip>
-                <a:blip r:embed="rId4"/>
+                <a:blip r:embed="rId3"/>
               </a:buBlip>
               <a:defRPr sz="1400" i="1">
                 <a:solidFill>
@@ -15489,7 +15598,7 @@
                 <a:spcPct val="20000"/>
               </a:spcBef>
               <a:buBlip>
-                <a:blip r:embed="rId4"/>
+                <a:blip r:embed="rId3"/>
               </a:buBlip>
               <a:defRPr sz="2000">
                 <a:solidFill>
@@ -15529,7 +15638,7 @@
                 <a:spcPct val="20000"/>
               </a:spcBef>
               <a:buBlip>
-                <a:blip r:embed="rId4"/>
+                <a:blip r:embed="rId3"/>
               </a:buBlip>
               <a:defRPr sz="1400" i="1">
                 <a:solidFill>
@@ -15680,23 +15789,23 @@
           <a:graphicData uri="http://schemas.openxmlformats.org/presentationml/2006/ole">
             <mc:AlternateContent xmlns:mc="http://schemas.openxmlformats.org/markup-compatibility/2006">
               <mc:Choice xmlns:v="urn:schemas-microsoft-com:vml" Requires="v">
-                <p:oleObj spid="_x0000_s43950" name="Equation" r:id="rId18" imgW="609480" imgH="228600" progId="Equation.DSMT4">
+                <p:oleObj name="Equation" r:id="rId17" imgW="609480" imgH="228600" progId="Equation.DSMT4">
                   <p:embed/>
                 </p:oleObj>
               </mc:Choice>
               <mc:Fallback>
-                <p:oleObj name="Equation" r:id="rId18" imgW="609480" imgH="228600" progId="Equation.DSMT4">
+                <p:oleObj name="Equation" r:id="rId17" imgW="609480" imgH="228600" progId="Equation.DSMT4">
                   <p:embed/>
                   <p:pic>
                     <p:nvPicPr>
-                      <p:cNvPr id="50183" name="Object 3"/>
+                      <p:cNvPr id="17" name="Object 3"/>
                       <p:cNvPicPr>
                         <a:picLocks noChangeAspect="1" noChangeArrowheads="1"/>
                       </p:cNvPicPr>
                       <p:nvPr/>
                     </p:nvPicPr>
                     <p:blipFill>
-                      <a:blip r:embed="rId19"/>
+                      <a:blip r:embed="rId18"/>
                       <a:srcRect/>
                       <a:stretch>
                         <a:fillRect/>
@@ -15806,23 +15915,23 @@
           <a:graphicData uri="http://schemas.openxmlformats.org/presentationml/2006/ole">
             <mc:AlternateContent xmlns:mc="http://schemas.openxmlformats.org/markup-compatibility/2006">
               <mc:Choice xmlns:v="urn:schemas-microsoft-com:vml" Requires="v">
-                <p:oleObj spid="_x0000_s43951" name="Equation" r:id="rId20" imgW="444240" imgH="203040" progId="Equation.DSMT4">
+                <p:oleObj name="Equation" r:id="rId19" imgW="444240" imgH="203040" progId="Equation.DSMT4">
                   <p:embed/>
                 </p:oleObj>
               </mc:Choice>
               <mc:Fallback>
-                <p:oleObj name="Equation" r:id="rId20" imgW="444240" imgH="203040" progId="Equation.DSMT4">
+                <p:oleObj name="Equation" r:id="rId19" imgW="444240" imgH="203040" progId="Equation.DSMT4">
                   <p:embed/>
                   <p:pic>
                     <p:nvPicPr>
-                      <p:cNvPr id="17" name="Object 3"/>
+                      <p:cNvPr id="23" name="Object 3"/>
                       <p:cNvPicPr>
                         <a:picLocks noChangeAspect="1" noChangeArrowheads="1"/>
                       </p:cNvPicPr>
                       <p:nvPr/>
                     </p:nvPicPr>
                     <p:blipFill>
-                      <a:blip r:embed="rId21"/>
+                      <a:blip r:embed="rId20"/>
                       <a:srcRect/>
                       <a:stretch>
                         <a:fillRect/>
@@ -15870,23 +15979,23 @@
           <a:graphicData uri="http://schemas.openxmlformats.org/presentationml/2006/ole">
             <mc:AlternateContent xmlns:mc="http://schemas.openxmlformats.org/markup-compatibility/2006">
               <mc:Choice xmlns:v="urn:schemas-microsoft-com:vml" Requires="v">
-                <p:oleObj spid="_x0000_s43952" name="Equation" r:id="rId22" imgW="609480" imgH="228600" progId="Equation.DSMT4">
+                <p:oleObj name="Equation" r:id="rId21" imgW="609480" imgH="228600" progId="Equation.DSMT4">
                   <p:embed/>
                 </p:oleObj>
               </mc:Choice>
               <mc:Fallback>
-                <p:oleObj name="Equation" r:id="rId22" imgW="609480" imgH="228600" progId="Equation.DSMT4">
+                <p:oleObj name="Equation" r:id="rId21" imgW="609480" imgH="228600" progId="Equation.DSMT4">
                   <p:embed/>
                   <p:pic>
                     <p:nvPicPr>
-                      <p:cNvPr id="17" name="Object 3"/>
+                      <p:cNvPr id="24" name="Object 3"/>
                       <p:cNvPicPr>
                         <a:picLocks noChangeAspect="1" noChangeArrowheads="1"/>
                       </p:cNvPicPr>
                       <p:nvPr/>
                     </p:nvPicPr>
                     <p:blipFill>
-                      <a:blip r:embed="rId23"/>
+                      <a:blip r:embed="rId22"/>
                       <a:srcRect/>
                       <a:stretch>
                         <a:fillRect/>
@@ -15996,23 +16105,23 @@
           <a:graphicData uri="http://schemas.openxmlformats.org/presentationml/2006/ole">
             <mc:AlternateContent xmlns:mc="http://schemas.openxmlformats.org/markup-compatibility/2006">
               <mc:Choice xmlns:v="urn:schemas-microsoft-com:vml" Requires="v">
-                <p:oleObj spid="_x0000_s43953" name="Equation" r:id="rId24" imgW="520560" imgH="203040" progId="Equation.DSMT4">
+                <p:oleObj name="Equation" r:id="rId23" imgW="520560" imgH="203040" progId="Equation.DSMT4">
                   <p:embed/>
                 </p:oleObj>
               </mc:Choice>
               <mc:Fallback>
-                <p:oleObj name="Equation" r:id="rId24" imgW="520560" imgH="203040" progId="Equation.DSMT4">
+                <p:oleObj name="Equation" r:id="rId23" imgW="520560" imgH="203040" progId="Equation.DSMT4">
                   <p:embed/>
                   <p:pic>
                     <p:nvPicPr>
-                      <p:cNvPr id="23" name="Object 3"/>
+                      <p:cNvPr id="27" name="Object 3"/>
                       <p:cNvPicPr>
                         <a:picLocks noChangeAspect="1" noChangeArrowheads="1"/>
                       </p:cNvPicPr>
                       <p:nvPr/>
                     </p:nvPicPr>
                     <p:blipFill>
-                      <a:blip r:embed="rId25"/>
+                      <a:blip r:embed="rId24"/>
                       <a:srcRect/>
                       <a:stretch>
                         <a:fillRect/>
@@ -16060,23 +16169,23 @@
           <a:graphicData uri="http://schemas.openxmlformats.org/presentationml/2006/ole">
             <mc:AlternateContent xmlns:mc="http://schemas.openxmlformats.org/markup-compatibility/2006">
               <mc:Choice xmlns:v="urn:schemas-microsoft-com:vml" Requires="v">
-                <p:oleObj spid="_x0000_s43954" name="Equation" r:id="rId26" imgW="914400" imgH="228600" progId="Equation.DSMT4">
+                <p:oleObj name="Equation" r:id="rId25" imgW="914400" imgH="228600" progId="Equation.DSMT4">
                   <p:embed/>
                 </p:oleObj>
               </mc:Choice>
               <mc:Fallback>
-                <p:oleObj name="Equation" r:id="rId26" imgW="914400" imgH="228600" progId="Equation.DSMT4">
+                <p:oleObj name="Equation" r:id="rId25" imgW="914400" imgH="228600" progId="Equation.DSMT4">
                   <p:embed/>
                   <p:pic>
                     <p:nvPicPr>
-                      <p:cNvPr id="24" name="Object 3"/>
+                      <p:cNvPr id="28" name="Object 3"/>
                       <p:cNvPicPr>
                         <a:picLocks noChangeAspect="1" noChangeArrowheads="1"/>
                       </p:cNvPicPr>
                       <p:nvPr/>
                     </p:nvPicPr>
                     <p:blipFill>
-                      <a:blip r:embed="rId27"/>
+                      <a:blip r:embed="rId26"/>
                       <a:srcRect/>
                       <a:stretch>
                         <a:fillRect/>
@@ -16166,7 +16275,7 @@
       </p:sp>
     </p:spTree>
     <p:custDataLst>
-      <p:tags r:id="rId2"/>
+      <p:tags r:id="rId1"/>
     </p:custDataLst>
   </p:cSld>
   <p:clrMapOvr>
@@ -16225,7 +16334,7 @@
                 <a:spcPct val="0"/>
               </a:spcAft>
               <a:buBlip>
-                <a:blip r:embed="rId4"/>
+                <a:blip r:embed="rId3"/>
               </a:buBlip>
               <a:defRPr sz="2000">
                 <a:solidFill>
@@ -16276,7 +16385,7 @@
                 <a:spcPct val="0"/>
               </a:spcAft>
               <a:buBlip>
-                <a:blip r:embed="rId4"/>
+                <a:blip r:embed="rId3"/>
               </a:buBlip>
               <a:defRPr sz="1400" i="1">
                 <a:solidFill>
@@ -16652,7 +16761,7 @@
                 <a:spcPct val="20000"/>
               </a:spcBef>
               <a:buBlip>
-                <a:blip r:embed="rId4"/>
+                <a:blip r:embed="rId3"/>
               </a:buBlip>
               <a:defRPr sz="2000">
                 <a:solidFill>
@@ -16692,7 +16801,7 @@
                 <a:spcPct val="20000"/>
               </a:spcBef>
               <a:buBlip>
-                <a:blip r:embed="rId4"/>
+                <a:blip r:embed="rId3"/>
               </a:buBlip>
               <a:defRPr sz="1400" i="1">
                 <a:solidFill>
@@ -16810,23 +16919,23 @@
           <a:graphicData uri="http://schemas.openxmlformats.org/presentationml/2006/ole">
             <mc:AlternateContent xmlns:mc="http://schemas.openxmlformats.org/markup-compatibility/2006">
               <mc:Choice xmlns:v="urn:schemas-microsoft-com:vml" Requires="v">
-                <p:oleObj spid="_x0000_s44934" name="Equation" r:id="rId5" imgW="215900" imgH="190500" progId="Equation.3">
+                <p:oleObj name="Equation" r:id="rId4" imgW="215900" imgH="190500" progId="Equation.3">
                   <p:embed/>
                 </p:oleObj>
               </mc:Choice>
               <mc:Fallback>
-                <p:oleObj name="Equation" r:id="rId5" imgW="215900" imgH="190500" progId="Equation.3">
+                <p:oleObj name="Equation" r:id="rId4" imgW="215900" imgH="190500" progId="Equation.3">
                   <p:embed/>
                   <p:pic>
                     <p:nvPicPr>
-                      <p:cNvPr id="0" name="图片 27800"/>
+                      <p:cNvPr id="6" name="Object 38"/>
                       <p:cNvPicPr>
                         <a:picLocks noChangeAspect="1" noChangeArrowheads="1"/>
                       </p:cNvPicPr>
                       <p:nvPr/>
                     </p:nvPicPr>
                     <p:blipFill>
-                      <a:blip r:embed="rId6"/>
+                      <a:blip r:embed="rId5"/>
                       <a:srcRect/>
                       <a:stretch>
                         <a:fillRect/>
@@ -17203,23 +17312,23 @@
           <a:graphicData uri="http://schemas.openxmlformats.org/presentationml/2006/ole">
             <mc:AlternateContent xmlns:mc="http://schemas.openxmlformats.org/markup-compatibility/2006">
               <mc:Choice xmlns:v="urn:schemas-microsoft-com:vml" Requires="v">
-                <p:oleObj spid="_x0000_s44935" name="Equation" r:id="rId7" imgW="800100" imgH="203200" progId="Equation.3">
+                <p:oleObj name="Equation" r:id="rId6" imgW="800100" imgH="203200" progId="Equation.3">
                   <p:embed/>
                 </p:oleObj>
               </mc:Choice>
               <mc:Fallback>
-                <p:oleObj name="Equation" r:id="rId7" imgW="800100" imgH="203200" progId="Equation.3">
+                <p:oleObj name="Equation" r:id="rId6" imgW="800100" imgH="203200" progId="Equation.3">
                   <p:embed/>
                   <p:pic>
                     <p:nvPicPr>
-                      <p:cNvPr id="0" name="图片 27800"/>
+                      <p:cNvPr id="4" name="Object 38"/>
                       <p:cNvPicPr>
                         <a:picLocks noChangeAspect="1" noChangeArrowheads="1"/>
                       </p:cNvPicPr>
                       <p:nvPr/>
                     </p:nvPicPr>
                     <p:blipFill>
-                      <a:blip r:embed="rId8"/>
+                      <a:blip r:embed="rId7"/>
                       <a:srcRect/>
                       <a:stretch>
                         <a:fillRect/>
@@ -17286,23 +17395,23 @@
           <a:graphicData uri="http://schemas.openxmlformats.org/presentationml/2006/ole">
             <mc:AlternateContent xmlns:mc="http://schemas.openxmlformats.org/markup-compatibility/2006">
               <mc:Choice xmlns:v="urn:schemas-microsoft-com:vml" Requires="v">
-                <p:oleObj spid="_x0000_s44936" name="Equation" r:id="rId9" imgW="2425680" imgH="241200" progId="Equation.DSMT4">
+                <p:oleObj name="Equation" r:id="rId8" imgW="2425680" imgH="241200" progId="Equation.DSMT4">
                   <p:embed/>
                 </p:oleObj>
               </mc:Choice>
               <mc:Fallback>
-                <p:oleObj name="Equation" r:id="rId9" imgW="2425680" imgH="241200" progId="Equation.DSMT4">
+                <p:oleObj name="Equation" r:id="rId8" imgW="2425680" imgH="241200" progId="Equation.DSMT4">
                   <p:embed/>
                   <p:pic>
                     <p:nvPicPr>
-                      <p:cNvPr id="0" name="图片 35988"/>
+                      <p:cNvPr id="51217" name="Object 6"/>
                       <p:cNvPicPr>
                         <a:picLocks noChangeAspect="1" noChangeArrowheads="1"/>
                       </p:cNvPicPr>
                       <p:nvPr/>
                     </p:nvPicPr>
                     <p:blipFill>
-                      <a:blip r:embed="rId10"/>
+                      <a:blip r:embed="rId9"/>
                       <a:srcRect/>
                       <a:stretch>
                         <a:fillRect/>
@@ -17350,23 +17459,23 @@
           <a:graphicData uri="http://schemas.openxmlformats.org/presentationml/2006/ole">
             <mc:AlternateContent xmlns:mc="http://schemas.openxmlformats.org/markup-compatibility/2006">
               <mc:Choice xmlns:v="urn:schemas-microsoft-com:vml" Requires="v">
-                <p:oleObj spid="_x0000_s44937" name="Equation" r:id="rId11" imgW="164880" imgH="190440" progId="Equation.DSMT4">
+                <p:oleObj name="Equation" r:id="rId10" imgW="164880" imgH="190440" progId="Equation.DSMT4">
                   <p:embed/>
                 </p:oleObj>
               </mc:Choice>
               <mc:Fallback>
-                <p:oleObj name="Equation" r:id="rId11" imgW="164880" imgH="190440" progId="Equation.DSMT4">
+                <p:oleObj name="Equation" r:id="rId10" imgW="164880" imgH="190440" progId="Equation.DSMT4">
                   <p:embed/>
                   <p:pic>
                     <p:nvPicPr>
-                      <p:cNvPr id="0" name="图片 27800"/>
+                      <p:cNvPr id="8" name="Object 38"/>
                       <p:cNvPicPr>
                         <a:picLocks noChangeAspect="1" noChangeArrowheads="1"/>
                       </p:cNvPicPr>
                       <p:nvPr/>
                     </p:nvPicPr>
                     <p:blipFill>
-                      <a:blip r:embed="rId12"/>
+                      <a:blip r:embed="rId11"/>
                       <a:srcRect/>
                       <a:stretch>
                         <a:fillRect/>
@@ -17414,23 +17523,23 @@
           <a:graphicData uri="http://schemas.openxmlformats.org/presentationml/2006/ole">
             <mc:AlternateContent xmlns:mc="http://schemas.openxmlformats.org/markup-compatibility/2006">
               <mc:Choice xmlns:v="urn:schemas-microsoft-com:vml" Requires="v">
-                <p:oleObj spid="_x0000_s44938" name="Equation" r:id="rId13" imgW="164880" imgH="190440" progId="Equation.DSMT4">
+                <p:oleObj name="Equation" r:id="rId12" imgW="164880" imgH="190440" progId="Equation.DSMT4">
                   <p:embed/>
                 </p:oleObj>
               </mc:Choice>
               <mc:Fallback>
-                <p:oleObj name="Equation" r:id="rId13" imgW="164880" imgH="190440" progId="Equation.DSMT4">
+                <p:oleObj name="Equation" r:id="rId12" imgW="164880" imgH="190440" progId="Equation.DSMT4">
                   <p:embed/>
                   <p:pic>
                     <p:nvPicPr>
-                      <p:cNvPr id="0" name="图片 27800"/>
+                      <p:cNvPr id="17" name="Object 38"/>
                       <p:cNvPicPr>
                         <a:picLocks noChangeAspect="1" noChangeArrowheads="1"/>
                       </p:cNvPicPr>
                       <p:nvPr/>
                     </p:nvPicPr>
                     <p:blipFill>
-                      <a:blip r:embed="rId14"/>
+                      <a:blip r:embed="rId13"/>
                       <a:srcRect/>
                       <a:stretch>
                         <a:fillRect/>
@@ -17478,23 +17587,23 @@
           <a:graphicData uri="http://schemas.openxmlformats.org/presentationml/2006/ole">
             <mc:AlternateContent xmlns:mc="http://schemas.openxmlformats.org/markup-compatibility/2006">
               <mc:Choice xmlns:v="urn:schemas-microsoft-com:vml" Requires="v">
-                <p:oleObj spid="_x0000_s44939" name="Equation" r:id="rId15" imgW="990360" imgH="228600" progId="Equation.DSMT4">
+                <p:oleObj name="Equation" r:id="rId14" imgW="990360" imgH="228600" progId="Equation.DSMT4">
                   <p:embed/>
                 </p:oleObj>
               </mc:Choice>
               <mc:Fallback>
-                <p:oleObj name="Equation" r:id="rId15" imgW="990360" imgH="228600" progId="Equation.DSMT4">
+                <p:oleObj name="Equation" r:id="rId14" imgW="990360" imgH="228600" progId="Equation.DSMT4">
                   <p:embed/>
                   <p:pic>
                     <p:nvPicPr>
-                      <p:cNvPr id="0" name="图片 35991"/>
+                      <p:cNvPr id="51222" name="Object 11"/>
                       <p:cNvPicPr>
                         <a:picLocks noChangeAspect="1" noChangeArrowheads="1"/>
                       </p:cNvPicPr>
                       <p:nvPr/>
                     </p:nvPicPr>
                     <p:blipFill>
-                      <a:blip r:embed="rId16"/>
+                      <a:blip r:embed="rId15"/>
                       <a:srcRect/>
                       <a:stretch>
                         <a:fillRect/>
@@ -17561,23 +17670,23 @@
           <a:graphicData uri="http://schemas.openxmlformats.org/presentationml/2006/ole">
             <mc:AlternateContent xmlns:mc="http://schemas.openxmlformats.org/markup-compatibility/2006">
               <mc:Choice xmlns:v="urn:schemas-microsoft-com:vml" Requires="v">
-                <p:oleObj spid="_x0000_s44940" name="Equation" r:id="rId17" imgW="1739880" imgH="228600" progId="Equation.DSMT4">
+                <p:oleObj name="Equation" r:id="rId16" imgW="1739880" imgH="228600" progId="Equation.DSMT4">
                   <p:embed/>
                 </p:oleObj>
               </mc:Choice>
               <mc:Fallback>
-                <p:oleObj name="Equation" r:id="rId17" imgW="1739880" imgH="228600" progId="Equation.DSMT4">
+                <p:oleObj name="Equation" r:id="rId16" imgW="1739880" imgH="228600" progId="Equation.DSMT4">
                   <p:embed/>
                   <p:pic>
                     <p:nvPicPr>
-                      <p:cNvPr id="0" name="图片 35992"/>
+                      <p:cNvPr id="51224" name="Object 13"/>
                       <p:cNvPicPr>
                         <a:picLocks noChangeAspect="1" noChangeArrowheads="1"/>
                       </p:cNvPicPr>
                       <p:nvPr/>
                     </p:nvPicPr>
                     <p:blipFill>
-                      <a:blip r:embed="rId18"/>
+                      <a:blip r:embed="rId17"/>
                       <a:srcRect/>
                       <a:stretch>
                         <a:fillRect/>
@@ -17653,7 +17762,7 @@
                 <a:spcPct val="20000"/>
               </a:spcBef>
               <a:buBlip>
-                <a:blip r:embed="rId4"/>
+                <a:blip r:embed="rId3"/>
               </a:buBlip>
               <a:defRPr sz="2000">
                 <a:solidFill>
@@ -17693,7 +17802,7 @@
                 <a:spcPct val="20000"/>
               </a:spcBef>
               <a:buBlip>
-                <a:blip r:embed="rId4"/>
+                <a:blip r:embed="rId3"/>
               </a:buBlip>
               <a:defRPr sz="1400" i="1">
                 <a:solidFill>
@@ -17854,7 +17963,7 @@
                 <a:spcPct val="20000"/>
               </a:spcBef>
               <a:buBlip>
-                <a:blip r:embed="rId4"/>
+                <a:blip r:embed="rId3"/>
               </a:buBlip>
               <a:defRPr sz="2000">
                 <a:solidFill>
@@ -17894,7 +18003,7 @@
                 <a:spcPct val="20000"/>
               </a:spcBef>
               <a:buBlip>
-                <a:blip r:embed="rId4"/>
+                <a:blip r:embed="rId3"/>
               </a:buBlip>
               <a:defRPr sz="1400" i="1">
                 <a:solidFill>
@@ -18045,21 +18154,21 @@
           <a:graphicData uri="http://schemas.openxmlformats.org/presentationml/2006/ole">
             <mc:AlternateContent xmlns:mc="http://schemas.openxmlformats.org/markup-compatibility/2006">
               <mc:Choice xmlns:v="urn:schemas-microsoft-com:vml" Requires="v">
-                <p:oleObj spid="_x0000_s44941" name="Equation" r:id="rId19" imgW="914400" imgH="164160" progId="Equation.DSMT4">
+                <p:oleObj name="Equation" r:id="rId18" imgW="914400" imgH="164160" progId="Equation.DSMT4">
                   <p:embed/>
                 </p:oleObj>
               </mc:Choice>
               <mc:Fallback>
-                <p:oleObj name="Equation" r:id="rId19" imgW="914400" imgH="164160" progId="Equation.DSMT4">
+                <p:oleObj name="Equation" r:id="rId18" imgW="914400" imgH="164160" progId="Equation.DSMT4">
                   <p:embed/>
                   <p:pic>
                     <p:nvPicPr>
-                      <p:cNvPr id="0" name=""/>
+                      <p:cNvPr id="3" name="对象 2"/>
                       <p:cNvPicPr/>
                       <p:nvPr/>
                     </p:nvPicPr>
                     <p:blipFill>
-                      <a:blip r:embed="rId20"/>
+                      <a:blip r:embed="rId19"/>
                       <a:stretch>
                         <a:fillRect/>
                       </a:stretch>
@@ -18136,23 +18245,23 @@
           <a:graphicData uri="http://schemas.openxmlformats.org/presentationml/2006/ole">
             <mc:AlternateContent xmlns:mc="http://schemas.openxmlformats.org/markup-compatibility/2006">
               <mc:Choice xmlns:v="urn:schemas-microsoft-com:vml" Requires="v">
-                <p:oleObj spid="_x0000_s44942" name="Equation" r:id="rId21" imgW="3720960" imgH="241200" progId="Equation.DSMT4">
+                <p:oleObj name="Equation" r:id="rId20" imgW="3720960" imgH="241200" progId="Equation.DSMT4">
                   <p:embed/>
                 </p:oleObj>
               </mc:Choice>
               <mc:Fallback>
-                <p:oleObj name="Equation" r:id="rId21" imgW="3720960" imgH="241200" progId="Equation.DSMT4">
+                <p:oleObj name="Equation" r:id="rId20" imgW="3720960" imgH="241200" progId="Equation.DSMT4">
                   <p:embed/>
                   <p:pic>
                     <p:nvPicPr>
-                      <p:cNvPr id="51217" name="Object 6"/>
+                      <p:cNvPr id="20" name="Object 6"/>
                       <p:cNvPicPr>
                         <a:picLocks noChangeAspect="1" noChangeArrowheads="1"/>
                       </p:cNvPicPr>
                       <p:nvPr/>
                     </p:nvPicPr>
                     <p:blipFill>
-                      <a:blip r:embed="rId22"/>
+                      <a:blip r:embed="rId21"/>
                       <a:srcRect/>
                       <a:stretch>
                         <a:fillRect/>
@@ -18180,7 +18289,7 @@
       </p:graphicFrame>
     </p:spTree>
     <p:custDataLst>
-      <p:tags r:id="rId2"/>
+      <p:tags r:id="rId1"/>
     </p:custDataLst>
   </p:cSld>
   <p:clrMapOvr>
@@ -18578,23 +18687,23 @@
           <a:graphicData uri="http://schemas.openxmlformats.org/presentationml/2006/ole">
             <mc:AlternateContent xmlns:mc="http://schemas.openxmlformats.org/markup-compatibility/2006">
               <mc:Choice xmlns:v="urn:schemas-microsoft-com:vml" Requires="v">
-                <p:oleObj spid="_x0000_s45902" name="Equation" r:id="rId3" imgW="139700" imgH="228600" progId="Equation.DSMT4">
+                <p:oleObj name="Equation" r:id="rId2" imgW="139700" imgH="228600" progId="Equation.DSMT4">
                   <p:embed/>
                 </p:oleObj>
               </mc:Choice>
               <mc:Fallback>
-                <p:oleObj name="Equation" r:id="rId3" imgW="139700" imgH="228600" progId="Equation.DSMT4">
+                <p:oleObj name="Equation" r:id="rId2" imgW="139700" imgH="228600" progId="Equation.DSMT4">
                   <p:embed/>
                   <p:pic>
                     <p:nvPicPr>
-                      <p:cNvPr id="0" name="图片 36994"/>
+                      <p:cNvPr id="52230" name="Object 3"/>
                       <p:cNvPicPr>
                         <a:picLocks noChangeAspect="1" noChangeArrowheads="1"/>
                       </p:cNvPicPr>
                       <p:nvPr/>
                     </p:nvPicPr>
                     <p:blipFill>
-                      <a:blip r:embed="rId4">
+                      <a:blip r:embed="rId3">
                         <a:extLst>
                           <a:ext uri="{28A0092B-C50C-407E-A947-70E740481C1C}">
                             <a14:useLocalDpi xmlns:a14="http://schemas.microsoft.com/office/drawing/2010/main" val="0"/>
@@ -18671,23 +18780,23 @@
           <a:graphicData uri="http://schemas.openxmlformats.org/presentationml/2006/ole">
             <mc:AlternateContent xmlns:mc="http://schemas.openxmlformats.org/markup-compatibility/2006">
               <mc:Choice xmlns:v="urn:schemas-microsoft-com:vml" Requires="v">
-                <p:oleObj spid="_x0000_s45903" name="Equation" r:id="rId5" imgW="165100" imgH="165100" progId="Equation.DSMT4">
+                <p:oleObj name="Equation" r:id="rId4" imgW="165100" imgH="165100" progId="Equation.DSMT4">
                   <p:embed/>
                 </p:oleObj>
               </mc:Choice>
               <mc:Fallback>
-                <p:oleObj name="Equation" r:id="rId5" imgW="165100" imgH="165100" progId="Equation.DSMT4">
+                <p:oleObj name="Equation" r:id="rId4" imgW="165100" imgH="165100" progId="Equation.DSMT4">
                   <p:embed/>
                   <p:pic>
                     <p:nvPicPr>
-                      <p:cNvPr id="0" name="图片 36995"/>
+                      <p:cNvPr id="52231" name="Object 5"/>
                       <p:cNvPicPr>
                         <a:picLocks noChangeAspect="1" noChangeArrowheads="1"/>
                       </p:cNvPicPr>
                       <p:nvPr/>
                     </p:nvPicPr>
                     <p:blipFill>
-                      <a:blip r:embed="rId6">
+                      <a:blip r:embed="rId5">
                         <a:extLst>
                           <a:ext uri="{28A0092B-C50C-407E-A947-70E740481C1C}">
                             <a14:useLocalDpi xmlns:a14="http://schemas.microsoft.com/office/drawing/2010/main" val="0"/>
@@ -19044,23 +19153,23 @@
           <a:graphicData uri="http://schemas.openxmlformats.org/presentationml/2006/ole">
             <mc:AlternateContent xmlns:mc="http://schemas.openxmlformats.org/markup-compatibility/2006">
               <mc:Choice xmlns:v="urn:schemas-microsoft-com:vml" Requires="v">
-                <p:oleObj spid="_x0000_s45904" name="Equation" r:id="rId7" imgW="152400" imgH="139700" progId="Equation.DSMT4">
+                <p:oleObj name="Equation" r:id="rId6" imgW="152400" imgH="139700" progId="Equation.DSMT4">
                   <p:embed/>
                 </p:oleObj>
               </mc:Choice>
               <mc:Fallback>
-                <p:oleObj name="Equation" r:id="rId7" imgW="152400" imgH="139700" progId="Equation.DSMT4">
+                <p:oleObj name="Equation" r:id="rId6" imgW="152400" imgH="139700" progId="Equation.DSMT4">
                   <p:embed/>
                   <p:pic>
                     <p:nvPicPr>
-                      <p:cNvPr id="0" name="图片 36997"/>
+                      <p:cNvPr id="52234" name="Object 7"/>
                       <p:cNvPicPr>
                         <a:picLocks noChangeAspect="1" noChangeArrowheads="1"/>
                       </p:cNvPicPr>
                       <p:nvPr/>
                     </p:nvPicPr>
                     <p:blipFill>
-                      <a:blip r:embed="rId8">
+                      <a:blip r:embed="rId7">
                         <a:extLst>
                           <a:ext uri="{28A0092B-C50C-407E-A947-70E740481C1C}">
                             <a14:useLocalDpi xmlns:a14="http://schemas.microsoft.com/office/drawing/2010/main" val="0"/>
@@ -19137,23 +19246,23 @@
           <a:graphicData uri="http://schemas.openxmlformats.org/presentationml/2006/ole">
             <mc:AlternateContent xmlns:mc="http://schemas.openxmlformats.org/markup-compatibility/2006">
               <mc:Choice xmlns:v="urn:schemas-microsoft-com:vml" Requires="v">
-                <p:oleObj spid="_x0000_s45905" name="Equation" r:id="rId9" imgW="152400" imgH="177800" progId="Equation.DSMT4">
+                <p:oleObj name="Equation" r:id="rId8" imgW="152400" imgH="177800" progId="Equation.DSMT4">
                   <p:embed/>
                 </p:oleObj>
               </mc:Choice>
               <mc:Fallback>
-                <p:oleObj name="Equation" r:id="rId9" imgW="152400" imgH="177800" progId="Equation.DSMT4">
+                <p:oleObj name="Equation" r:id="rId8" imgW="152400" imgH="177800" progId="Equation.DSMT4">
                   <p:embed/>
                   <p:pic>
                     <p:nvPicPr>
-                      <p:cNvPr id="0" name="图片 36998"/>
+                      <p:cNvPr id="52235" name="Object 8"/>
                       <p:cNvPicPr>
                         <a:picLocks noChangeAspect="1" noChangeArrowheads="1"/>
                       </p:cNvPicPr>
                       <p:nvPr/>
                     </p:nvPicPr>
                     <p:blipFill>
-                      <a:blip r:embed="rId10">
+                      <a:blip r:embed="rId9">
                         <a:extLst>
                           <a:ext uri="{28A0092B-C50C-407E-A947-70E740481C1C}">
                             <a14:useLocalDpi xmlns:a14="http://schemas.microsoft.com/office/drawing/2010/main" val="0"/>
@@ -19220,23 +19329,23 @@
           <a:graphicData uri="http://schemas.openxmlformats.org/presentationml/2006/ole">
             <mc:AlternateContent xmlns:mc="http://schemas.openxmlformats.org/markup-compatibility/2006">
               <mc:Choice xmlns:v="urn:schemas-microsoft-com:vml" Requires="v">
-                <p:oleObj spid="_x0000_s45906" name="Equation" r:id="rId11" imgW="177800" imgH="177800" progId="Equation.DSMT4">
+                <p:oleObj name="Equation" r:id="rId10" imgW="177800" imgH="177800" progId="Equation.DSMT4">
                   <p:embed/>
                 </p:oleObj>
               </mc:Choice>
               <mc:Fallback>
-                <p:oleObj name="Equation" r:id="rId11" imgW="177800" imgH="177800" progId="Equation.DSMT4">
+                <p:oleObj name="Equation" r:id="rId10" imgW="177800" imgH="177800" progId="Equation.DSMT4">
                   <p:embed/>
                   <p:pic>
                     <p:nvPicPr>
-                      <p:cNvPr id="0" name="图片 36999"/>
+                      <p:cNvPr id="52236" name="Object 9"/>
                       <p:cNvPicPr>
                         <a:picLocks noChangeAspect="1" noChangeArrowheads="1"/>
                       </p:cNvPicPr>
                       <p:nvPr/>
                     </p:nvPicPr>
                     <p:blipFill>
-                      <a:blip r:embed="rId12">
+                      <a:blip r:embed="rId11">
                         <a:extLst>
                           <a:ext uri="{28A0092B-C50C-407E-A947-70E740481C1C}">
                             <a14:useLocalDpi xmlns:a14="http://schemas.microsoft.com/office/drawing/2010/main" val="0"/>
@@ -19303,23 +19412,23 @@
           <a:graphicData uri="http://schemas.openxmlformats.org/presentationml/2006/ole">
             <mc:AlternateContent xmlns:mc="http://schemas.openxmlformats.org/markup-compatibility/2006">
               <mc:Choice xmlns:v="urn:schemas-microsoft-com:vml" Requires="v">
-                <p:oleObj spid="_x0000_s45907" name="Equation" r:id="rId13" imgW="127000" imgH="165100" progId="Equation.DSMT4">
+                <p:oleObj name="Equation" r:id="rId12" imgW="127000" imgH="165100" progId="Equation.DSMT4">
                   <p:embed/>
                 </p:oleObj>
               </mc:Choice>
               <mc:Fallback>
-                <p:oleObj name="Equation" r:id="rId13" imgW="127000" imgH="165100" progId="Equation.DSMT4">
+                <p:oleObj name="Equation" r:id="rId12" imgW="127000" imgH="165100" progId="Equation.DSMT4">
                   <p:embed/>
                   <p:pic>
                     <p:nvPicPr>
-                      <p:cNvPr id="0" name="图片 37000"/>
+                      <p:cNvPr id="52237" name="Object 10"/>
                       <p:cNvPicPr>
                         <a:picLocks noChangeAspect="1" noChangeArrowheads="1"/>
                       </p:cNvPicPr>
                       <p:nvPr/>
                     </p:nvPicPr>
                     <p:blipFill>
-                      <a:blip r:embed="rId14">
+                      <a:blip r:embed="rId13">
                         <a:extLst>
                           <a:ext uri="{28A0092B-C50C-407E-A947-70E740481C1C}">
                             <a14:useLocalDpi xmlns:a14="http://schemas.microsoft.com/office/drawing/2010/main" val="0"/>
@@ -19420,7 +19529,7 @@
                 <a:spcPct val="20000"/>
               </a:spcBef>
               <a:buBlip>
-                <a:blip r:embed="rId15"/>
+                <a:blip r:embed="rId14"/>
               </a:buBlip>
               <a:defRPr sz="2000">
                 <a:solidFill>
@@ -19460,7 +19569,7 @@
                 <a:spcPct val="20000"/>
               </a:spcBef>
               <a:buBlip>
-                <a:blip r:embed="rId15"/>
+                <a:blip r:embed="rId14"/>
               </a:buBlip>
               <a:defRPr sz="1400" i="1">
                 <a:solidFill>
@@ -19621,7 +19730,7 @@
                 <a:spcPct val="20000"/>
               </a:spcBef>
               <a:buBlip>
-                <a:blip r:embed="rId15"/>
+                <a:blip r:embed="rId14"/>
               </a:buBlip>
               <a:defRPr sz="2000">
                 <a:solidFill>
@@ -19661,7 +19770,7 @@
                 <a:spcPct val="20000"/>
               </a:spcBef>
               <a:buBlip>
-                <a:blip r:embed="rId15"/>
+                <a:blip r:embed="rId14"/>
               </a:buBlip>
               <a:defRPr sz="1400" i="1">
                 <a:solidFill>
@@ -19812,23 +19921,23 @@
           <a:graphicData uri="http://schemas.openxmlformats.org/presentationml/2006/ole">
             <mc:AlternateContent xmlns:mc="http://schemas.openxmlformats.org/markup-compatibility/2006">
               <mc:Choice xmlns:v="urn:schemas-microsoft-com:vml" Requires="v">
-                <p:oleObj spid="_x0000_s45908" name="Equation" r:id="rId16" imgW="533160" imgH="228600" progId="Equation.DSMT4">
+                <p:oleObj name="Equation" r:id="rId15" imgW="533160" imgH="228600" progId="Equation.DSMT4">
                   <p:embed/>
                 </p:oleObj>
               </mc:Choice>
               <mc:Fallback>
-                <p:oleObj name="Equation" r:id="rId16" imgW="533160" imgH="228600" progId="Equation.DSMT4">
+                <p:oleObj name="Equation" r:id="rId15" imgW="533160" imgH="228600" progId="Equation.DSMT4">
                   <p:embed/>
                   <p:pic>
                     <p:nvPicPr>
-                      <p:cNvPr id="51222" name="Object 11"/>
+                      <p:cNvPr id="17" name="Object 11"/>
                       <p:cNvPicPr>
                         <a:picLocks noChangeAspect="1" noChangeArrowheads="1"/>
                       </p:cNvPicPr>
                       <p:nvPr/>
                     </p:nvPicPr>
                     <p:blipFill>
-                      <a:blip r:embed="rId17"/>
+                      <a:blip r:embed="rId16"/>
                       <a:srcRect/>
                       <a:stretch>
                         <a:fillRect/>
@@ -19895,23 +20004,23 @@
           <a:graphicData uri="http://schemas.openxmlformats.org/presentationml/2006/ole">
             <mc:AlternateContent xmlns:mc="http://schemas.openxmlformats.org/markup-compatibility/2006">
               <mc:Choice xmlns:v="urn:schemas-microsoft-com:vml" Requires="v">
-                <p:oleObj spid="_x0000_s45909" name="Equation" r:id="rId18" imgW="1041120" imgH="177480" progId="Equation.DSMT4">
+                <p:oleObj name="Equation" r:id="rId17" imgW="1041120" imgH="177480" progId="Equation.DSMT4">
                   <p:embed/>
                 </p:oleObj>
               </mc:Choice>
               <mc:Fallback>
-                <p:oleObj name="Equation" r:id="rId18" imgW="1041120" imgH="177480" progId="Equation.DSMT4">
+                <p:oleObj name="Equation" r:id="rId17" imgW="1041120" imgH="177480" progId="Equation.DSMT4">
                   <p:embed/>
                   <p:pic>
                     <p:nvPicPr>
-                      <p:cNvPr id="51222" name="Object 11"/>
+                      <p:cNvPr id="18" name="Object 11"/>
                       <p:cNvPicPr>
                         <a:picLocks noChangeAspect="1" noChangeArrowheads="1"/>
                       </p:cNvPicPr>
                       <p:nvPr/>
                     </p:nvPicPr>
                     <p:blipFill>
-                      <a:blip r:embed="rId19"/>
+                      <a:blip r:embed="rId18"/>
                       <a:srcRect/>
                       <a:stretch>
                         <a:fillRect/>
@@ -20031,7 +20140,7 @@
                 <a:spcPct val="20000"/>
               </a:spcBef>
               <a:buBlip>
-                <a:blip r:embed="rId4"/>
+                <a:blip r:embed="rId3"/>
               </a:buBlip>
               <a:defRPr sz="2000">
                 <a:solidFill>
@@ -20071,7 +20180,7 @@
                 <a:spcPct val="20000"/>
               </a:spcBef>
               <a:buBlip>
-                <a:blip r:embed="rId4"/>
+                <a:blip r:embed="rId3"/>
               </a:buBlip>
               <a:defRPr sz="1400" i="1">
                 <a:solidFill>
@@ -20195,23 +20304,23 @@
           <a:graphicData uri="http://schemas.openxmlformats.org/presentationml/2006/ole">
             <mc:AlternateContent xmlns:mc="http://schemas.openxmlformats.org/markup-compatibility/2006">
               <mc:Choice xmlns:v="urn:schemas-microsoft-com:vml" Requires="v">
-                <p:oleObj spid="_x0000_s46286" name="Equation" r:id="rId5" imgW="152400" imgH="139700" progId="Equation.3">
+                <p:oleObj name="Equation" r:id="rId4" imgW="152400" imgH="139700" progId="Equation.3">
                   <p:embed/>
                 </p:oleObj>
               </mc:Choice>
               <mc:Fallback>
-                <p:oleObj name="Equation" r:id="rId5" imgW="152400" imgH="139700" progId="Equation.3">
+                <p:oleObj name="Equation" r:id="rId4" imgW="152400" imgH="139700" progId="Equation.3">
                   <p:embed/>
                   <p:pic>
                     <p:nvPicPr>
-                      <p:cNvPr id="0" name="图片 27800"/>
+                      <p:cNvPr id="6" name="Object 38"/>
                       <p:cNvPicPr>
                         <a:picLocks noChangeAspect="1" noChangeArrowheads="1"/>
                       </p:cNvPicPr>
                       <p:nvPr/>
                     </p:nvPicPr>
                     <p:blipFill>
-                      <a:blip r:embed="rId6"/>
+                      <a:blip r:embed="rId5"/>
                       <a:srcRect/>
                       <a:stretch>
                         <a:fillRect/>
@@ -20306,7 +20415,7 @@
                 <a:spcPct val="20000"/>
               </a:spcBef>
               <a:buBlip>
-                <a:blip r:embed="rId4"/>
+                <a:blip r:embed="rId3"/>
               </a:buBlip>
               <a:defRPr sz="2000">
                 <a:solidFill>
@@ -20346,7 +20455,7 @@
                 <a:spcPct val="20000"/>
               </a:spcBef>
               <a:buBlip>
-                <a:blip r:embed="rId4"/>
+                <a:blip r:embed="rId3"/>
               </a:buBlip>
               <a:defRPr sz="1400" i="1">
                 <a:solidFill>
@@ -20674,7 +20783,7 @@
                 <a:spcPct val="20000"/>
               </a:spcBef>
               <a:buBlip>
-                <a:blip r:embed="rId4"/>
+                <a:blip r:embed="rId3"/>
               </a:buBlip>
               <a:defRPr sz="2000">
                 <a:solidFill>
@@ -20714,7 +20823,7 @@
                 <a:spcPct val="20000"/>
               </a:spcBef>
               <a:buBlip>
-                <a:blip r:embed="rId4"/>
+                <a:blip r:embed="rId3"/>
               </a:buBlip>
               <a:defRPr sz="1400" i="1">
                 <a:solidFill>
@@ -20877,7 +20986,7 @@
                 <a:spcPct val="20000"/>
               </a:spcBef>
               <a:buBlip>
-                <a:blip r:embed="rId4"/>
+                <a:blip r:embed="rId3"/>
               </a:buBlip>
               <a:defRPr sz="2000">
                 <a:solidFill>
@@ -20917,7 +21026,7 @@
                 <a:spcPct val="20000"/>
               </a:spcBef>
               <a:buBlip>
-                <a:blip r:embed="rId4"/>
+                <a:blip r:embed="rId3"/>
               </a:buBlip>
               <a:defRPr sz="1400" i="1">
                 <a:solidFill>
@@ -21095,7 +21204,7 @@
                 <a:spcPct val="20000"/>
               </a:spcBef>
               <a:buBlip>
-                <a:blip r:embed="rId4"/>
+                <a:blip r:embed="rId3"/>
               </a:buBlip>
               <a:defRPr sz="2000">
                 <a:solidFill>
@@ -21135,7 +21244,7 @@
                 <a:spcPct val="20000"/>
               </a:spcBef>
               <a:buBlip>
-                <a:blip r:embed="rId4"/>
+                <a:blip r:embed="rId3"/>
               </a:buBlip>
               <a:defRPr sz="1400" i="1">
                 <a:solidFill>
@@ -21296,7 +21405,7 @@
                 <a:spcPct val="20000"/>
               </a:spcBef>
               <a:buBlip>
-                <a:blip r:embed="rId4"/>
+                <a:blip r:embed="rId3"/>
               </a:buBlip>
               <a:defRPr sz="2000">
                 <a:solidFill>
@@ -21336,7 +21445,7 @@
                 <a:spcPct val="20000"/>
               </a:spcBef>
               <a:buBlip>
-                <a:blip r:embed="rId4"/>
+                <a:blip r:embed="rId3"/>
               </a:buBlip>
               <a:defRPr sz="1400" i="1">
                 <a:solidFill>
@@ -21474,7 +21583,7 @@
           <p:nvPr/>
         </p:nvPicPr>
         <p:blipFill>
-          <a:blip r:embed="rId7">
+          <a:blip r:embed="rId6">
             <a:extLst>
               <a:ext uri="{28A0092B-C50C-407E-A947-70E740481C1C}">
                 <a14:useLocalDpi xmlns:a14="http://schemas.microsoft.com/office/drawing/2010/main" val="0"/>
@@ -21685,23 +21794,23 @@
           <a:graphicData uri="http://schemas.openxmlformats.org/presentationml/2006/ole">
             <mc:AlternateContent xmlns:mc="http://schemas.openxmlformats.org/markup-compatibility/2006">
               <mc:Choice xmlns:v="urn:schemas-microsoft-com:vml" Requires="v">
-                <p:oleObj spid="_x0000_s46287" name="Equation" r:id="rId8" imgW="2197080" imgH="469800" progId="Equation.DSMT4">
+                <p:oleObj name="Equation" r:id="rId7" imgW="2197080" imgH="469800" progId="Equation.DSMT4">
                   <p:embed/>
                 </p:oleObj>
               </mc:Choice>
               <mc:Fallback>
-                <p:oleObj name="Equation" r:id="rId8" imgW="2197080" imgH="469800" progId="Equation.DSMT4">
+                <p:oleObj name="Equation" r:id="rId7" imgW="2197080" imgH="469800" progId="Equation.DSMT4">
                   <p:embed/>
                   <p:pic>
                     <p:nvPicPr>
-                      <p:cNvPr id="18" name="Object 11"/>
+                      <p:cNvPr id="16" name="Object 11"/>
                       <p:cNvPicPr>
                         <a:picLocks noChangeAspect="1" noChangeArrowheads="1"/>
                       </p:cNvPicPr>
                       <p:nvPr/>
                     </p:nvPicPr>
                     <p:blipFill>
-                      <a:blip r:embed="rId9"/>
+                      <a:blip r:embed="rId8"/>
                       <a:srcRect/>
                       <a:stretch>
                         <a:fillRect/>
@@ -21729,7 +21838,7 @@
       </p:graphicFrame>
     </p:spTree>
     <p:custDataLst>
-      <p:tags r:id="rId2"/>
+      <p:tags r:id="rId1"/>
     </p:custDataLst>
   </p:cSld>
   <p:clrMapOvr>
@@ -21768,7 +21877,7 @@
         </p:nvSpPr>
         <p:spPr>
           <a:xfrm>
-            <a:off x="724535" y="1868805"/>
+            <a:off x="406400" y="1889760"/>
             <a:ext cx="7416800" cy="4526280"/>
           </a:xfrm>
         </p:spPr>
@@ -21924,7 +22033,7 @@
                 <a:spcPct val="0"/>
               </a:spcAft>
               <a:buBlip>
-                <a:blip r:embed="rId4"/>
+                <a:blip r:embed="rId3"/>
               </a:buBlip>
               <a:defRPr sz="2000">
                 <a:solidFill>
@@ -21975,7 +22084,7 @@
                 <a:spcPct val="0"/>
               </a:spcAft>
               <a:buBlip>
-                <a:blip r:embed="rId4"/>
+                <a:blip r:embed="rId3"/>
               </a:buBlip>
               <a:defRPr sz="1400" i="1">
                 <a:solidFill>
@@ -22126,7 +22235,7 @@
                 <a:spcPct val="20000"/>
               </a:spcBef>
               <a:buBlip>
-                <a:blip r:embed="rId4"/>
+                <a:blip r:embed="rId3"/>
               </a:buBlip>
               <a:defRPr sz="2000">
                 <a:solidFill>
@@ -22166,7 +22275,7 @@
                 <a:spcPct val="20000"/>
               </a:spcBef>
               <a:buBlip>
-                <a:blip r:embed="rId4"/>
+                <a:blip r:embed="rId3"/>
               </a:buBlip>
               <a:defRPr sz="1400" i="1">
                 <a:solidFill>
@@ -22274,33 +22383,39 @@
           <p:cNvGraphicFramePr>
             <a:graphicFrameLocks noChangeAspect="1"/>
           </p:cNvGraphicFramePr>
-          <p:nvPr/>
+          <p:nvPr>
+            <p:extLst>
+              <p:ext uri="{D42A27DB-BD31-4B8C-83A1-F6EECF244321}">
+                <p14:modId xmlns:p14="http://schemas.microsoft.com/office/powerpoint/2010/main" val="4102304067"/>
+              </p:ext>
+            </p:extLst>
+          </p:nvPr>
         </p:nvGraphicFramePr>
         <p:xfrm>
-          <a:off x="1730058" y="4841875"/>
+          <a:off x="1593326" y="4878517"/>
           <a:ext cx="2193290" cy="1534160"/>
         </p:xfrm>
         <a:graphic>
           <a:graphicData uri="http://schemas.openxmlformats.org/presentationml/2006/ole">
             <mc:AlternateContent xmlns:mc="http://schemas.openxmlformats.org/markup-compatibility/2006">
               <mc:Choice xmlns:v="urn:schemas-microsoft-com:vml" Requires="v">
-                <p:oleObj spid="_x0000_s47433" name="Equation" r:id="rId5" imgW="1091565" imgH="774065" progId="Equation.3">
+                <p:oleObj name="Equation" r:id="rId4" imgW="1091565" imgH="774065" progId="Equation.3">
                   <p:embed/>
                 </p:oleObj>
               </mc:Choice>
               <mc:Fallback>
-                <p:oleObj name="Equation" r:id="rId5" imgW="1091565" imgH="774065" progId="Equation.3">
+                <p:oleObj name="Equation" r:id="rId4" imgW="1091565" imgH="774065" progId="Equation.3">
                   <p:embed/>
                   <p:pic>
                     <p:nvPicPr>
-                      <p:cNvPr id="0" name="图片 27800"/>
+                      <p:cNvPr id="6" name="Object 38"/>
                       <p:cNvPicPr>
                         <a:picLocks noChangeAspect="1" noChangeArrowheads="1"/>
                       </p:cNvPicPr>
                       <p:nvPr/>
                     </p:nvPicPr>
                     <p:blipFill>
-                      <a:blip r:embed="rId6"/>
+                      <a:blip r:embed="rId5"/>
                       <a:srcRect/>
                       <a:stretch>
                         <a:fillRect/>
@@ -22308,7 +22423,7 @@
                     </p:blipFill>
                     <p:spPr bwMode="auto">
                       <a:xfrm>
-                        <a:off x="1730058" y="4841875"/>
+                        <a:off x="1593326" y="4878517"/>
                         <a:ext cx="2193290" cy="1534160"/>
                       </a:xfrm>
                       <a:prstGeom prst="rect">
@@ -22354,36 +22469,36 @@
           <p:nvPr>
             <p:extLst>
               <p:ext uri="{D42A27DB-BD31-4B8C-83A1-F6EECF244321}">
-                <p14:modId xmlns:p14="http://schemas.microsoft.com/office/powerpoint/2010/main" val="940448446"/>
+                <p14:modId xmlns:p14="http://schemas.microsoft.com/office/powerpoint/2010/main" val="1791803810"/>
               </p:ext>
             </p:extLst>
           </p:nvPr>
         </p:nvGraphicFramePr>
         <p:xfrm>
-          <a:off x="973138" y="2630488"/>
-          <a:ext cx="2239962" cy="814387"/>
+          <a:off x="514905" y="2463888"/>
+          <a:ext cx="2698195" cy="980988"/>
         </p:xfrm>
         <a:graphic>
           <a:graphicData uri="http://schemas.openxmlformats.org/presentationml/2006/ole">
             <mc:AlternateContent xmlns:mc="http://schemas.openxmlformats.org/markup-compatibility/2006">
               <mc:Choice xmlns:v="urn:schemas-microsoft-com:vml" Requires="v">
-                <p:oleObj spid="_x0000_s47434" name="Equation" r:id="rId7" imgW="977760" imgH="355320" progId="Equation.DSMT4">
+                <p:oleObj name="Equation" r:id="rId6" imgW="977760" imgH="355320" progId="Equation.DSMT4">
                   <p:embed/>
                 </p:oleObj>
               </mc:Choice>
               <mc:Fallback>
-                <p:oleObj name="Equation" r:id="rId7" imgW="977760" imgH="355320" progId="Equation.DSMT4">
+                <p:oleObj name="Equation" r:id="rId6" imgW="977760" imgH="355320" progId="Equation.DSMT4">
                   <p:embed/>
                   <p:pic>
                     <p:nvPicPr>
-                      <p:cNvPr id="0" name="图片 37944"/>
+                      <p:cNvPr id="53257" name="Object 11"/>
                       <p:cNvPicPr>
                         <a:picLocks noChangeAspect="1" noChangeArrowheads="1"/>
                       </p:cNvPicPr>
                       <p:nvPr/>
                     </p:nvPicPr>
                     <p:blipFill>
-                      <a:blip r:embed="rId8"/>
+                      <a:blip r:embed="rId7"/>
                       <a:srcRect/>
                       <a:stretch>
                         <a:fillRect/>
@@ -22391,8 +22506,8 @@
                     </p:blipFill>
                     <p:spPr bwMode="auto">
                       <a:xfrm>
-                        <a:off x="973138" y="2630488"/>
-                        <a:ext cx="2239962" cy="814387"/>
+                        <a:off x="514905" y="2463888"/>
+                        <a:ext cx="2698195" cy="980988"/>
                       </a:xfrm>
                       <a:prstGeom prst="rect">
                         <a:avLst/>
@@ -22402,34 +22517,6 @@
                         <a:noFill/>
                       </a:ln>
                       <a:effectLst/>
-                      <a:extLst>
-                        <a:ext uri="{909E8E84-426E-40DD-AFC4-6F175D3DCCD1}">
-                          <a14:hiddenFill xmlns:a14="http://schemas.microsoft.com/office/drawing/2010/main">
-                            <a:solidFill>
-                              <a:srgbClr val="FFFFFF"/>
-                            </a:solidFill>
-                          </a14:hiddenFill>
-                        </a:ext>
-                        <a:ext uri="{91240B29-F687-4F45-9708-019B960494DF}">
-                          <a14:hiddenLine xmlns:a14="http://schemas.microsoft.com/office/drawing/2010/main" w="9525">
-                            <a:solidFill>
-                              <a:srgbClr val="000000"/>
-                            </a:solidFill>
-                            <a:miter lim="800000"/>
-                            <a:headEnd/>
-                            <a:tailEnd/>
-                          </a14:hiddenLine>
-                        </a:ext>
-                        <a:ext uri="{AF507438-7753-43E0-B8FC-AC1667EBCBE1}">
-                          <a14:hiddenEffects xmlns:a14="http://schemas.microsoft.com/office/drawing/2010/main">
-                            <a:effectLst>
-                              <a:outerShdw dist="35921" dir="2700000" algn="ctr" rotWithShape="0">
-                                <a:srgbClr val="808080"/>
-                              </a:outerShdw>
-                            </a:effectLst>
-                          </a14:hiddenEffects>
-                        </a:ext>
-                      </a:extLst>
                     </p:spPr>
                   </p:pic>
                 </p:oleObj>
@@ -22488,7 +22575,7 @@
                 <a:spcPct val="20000"/>
               </a:spcBef>
               <a:buBlip>
-                <a:blip r:embed="rId4"/>
+                <a:blip r:embed="rId3"/>
               </a:buBlip>
               <a:defRPr sz="2000">
                 <a:solidFill>
@@ -22528,7 +22615,7 @@
                 <a:spcPct val="20000"/>
               </a:spcBef>
               <a:buBlip>
-                <a:blip r:embed="rId4"/>
+                <a:blip r:embed="rId3"/>
               </a:buBlip>
               <a:defRPr sz="1400" i="1">
                 <a:solidFill>
@@ -22724,7 +22811,7 @@
                 <a:spcPct val="20000"/>
               </a:spcBef>
               <a:buBlip>
-                <a:blip r:embed="rId4"/>
+                <a:blip r:embed="rId3"/>
               </a:buBlip>
               <a:defRPr sz="2000">
                 <a:solidFill>
@@ -22764,7 +22851,7 @@
                 <a:spcPct val="20000"/>
               </a:spcBef>
               <a:buBlip>
-                <a:blip r:embed="rId4"/>
+                <a:blip r:embed="rId3"/>
               </a:buBlip>
               <a:defRPr sz="1400" i="1">
                 <a:solidFill>
@@ -22900,99 +22987,6 @@
           </a:p>
         </p:txBody>
       </p:sp>
-      <p:graphicFrame>
-        <p:nvGraphicFramePr>
-          <p:cNvPr id="9" name="Object 11"/>
-          <p:cNvGraphicFramePr>
-            <a:graphicFrameLocks noChangeAspect="1"/>
-          </p:cNvGraphicFramePr>
-          <p:nvPr>
-            <p:extLst>
-              <p:ext uri="{D42A27DB-BD31-4B8C-83A1-F6EECF244321}">
-                <p14:modId xmlns:p14="http://schemas.microsoft.com/office/powerpoint/2010/main" val="2600290734"/>
-              </p:ext>
-            </p:extLst>
-          </p:nvPr>
-        </p:nvGraphicFramePr>
-        <p:xfrm>
-          <a:off x="827088" y="3751263"/>
-          <a:ext cx="3930650" cy="1017587"/>
-        </p:xfrm>
-        <a:graphic>
-          <a:graphicData uri="http://schemas.openxmlformats.org/presentationml/2006/ole">
-            <mc:AlternateContent xmlns:mc="http://schemas.openxmlformats.org/markup-compatibility/2006">
-              <mc:Choice xmlns:v="urn:schemas-microsoft-com:vml" Requires="v">
-                <p:oleObj spid="_x0000_s47435" name="Equation" r:id="rId9" imgW="1714320" imgH="444240" progId="Equation.DSMT4">
-                  <p:embed/>
-                </p:oleObj>
-              </mc:Choice>
-              <mc:Fallback>
-                <p:oleObj name="Equation" r:id="rId9" imgW="1714320" imgH="444240" progId="Equation.DSMT4">
-                  <p:embed/>
-                  <p:pic>
-                    <p:nvPicPr>
-                      <p:cNvPr id="0" name="图片 37944"/>
-                      <p:cNvPicPr>
-                        <a:picLocks noChangeAspect="1" noChangeArrowheads="1"/>
-                      </p:cNvPicPr>
-                      <p:nvPr/>
-                    </p:nvPicPr>
-                    <p:blipFill>
-                      <a:blip r:embed="rId10"/>
-                      <a:srcRect/>
-                      <a:stretch>
-                        <a:fillRect/>
-                      </a:stretch>
-                    </p:blipFill>
-                    <p:spPr bwMode="auto">
-                      <a:xfrm>
-                        <a:off x="827088" y="3751263"/>
-                        <a:ext cx="3930650" cy="1017587"/>
-                      </a:xfrm>
-                      <a:prstGeom prst="rect">
-                        <a:avLst/>
-                      </a:prstGeom>
-                      <a:noFill/>
-                      <a:ln>
-                        <a:noFill/>
-                      </a:ln>
-                      <a:effectLst/>
-                      <a:extLst>
-                        <a:ext uri="{909E8E84-426E-40DD-AFC4-6F175D3DCCD1}">
-                          <a14:hiddenFill xmlns:a14="http://schemas.microsoft.com/office/drawing/2010/main">
-                            <a:solidFill>
-                              <a:srgbClr val="FFFFFF"/>
-                            </a:solidFill>
-                          </a14:hiddenFill>
-                        </a:ext>
-                        <a:ext uri="{91240B29-F687-4F45-9708-019B960494DF}">
-                          <a14:hiddenLine xmlns:a14="http://schemas.microsoft.com/office/drawing/2010/main" w="9525">
-                            <a:solidFill>
-                              <a:srgbClr val="000000"/>
-                            </a:solidFill>
-                            <a:miter lim="800000"/>
-                            <a:headEnd/>
-                            <a:tailEnd/>
-                          </a14:hiddenLine>
-                        </a:ext>
-                        <a:ext uri="{AF507438-7753-43E0-B8FC-AC1667EBCBE1}">
-                          <a14:hiddenEffects xmlns:a14="http://schemas.microsoft.com/office/drawing/2010/main">
-                            <a:effectLst>
-                              <a:outerShdw dist="35921" dir="2700000" algn="ctr" rotWithShape="0">
-                                <a:srgbClr val="808080"/>
-                              </a:outerShdw>
-                            </a:effectLst>
-                          </a14:hiddenEffects>
-                        </a:ext>
-                      </a:extLst>
-                    </p:spPr>
-                  </p:pic>
-                </p:oleObj>
-              </mc:Fallback>
-            </mc:AlternateContent>
-          </a:graphicData>
-        </a:graphic>
-      </p:graphicFrame>
       <p:cxnSp>
         <p:nvCxnSpPr>
           <p:cNvPr id="56324" name="Straight Arrow Connector 5"/>
@@ -23003,7 +22997,7 @@
         </p:nvCxnSpPr>
         <p:spPr bwMode="auto">
           <a:xfrm flipV="1">
-            <a:off x="4736672" y="2157363"/>
+            <a:off x="4400232" y="2184021"/>
             <a:ext cx="314325" cy="9525"/>
           </a:xfrm>
           <a:prstGeom prst="straightConnector1">
@@ -23076,7 +23070,7 @@
                 <a:spcPct val="20000"/>
               </a:spcBef>
               <a:buBlip>
-                <a:blip r:embed="rId4"/>
+                <a:blip r:embed="rId3"/>
               </a:buBlip>
               <a:defRPr sz="2000">
                 <a:solidFill>
@@ -23116,7 +23110,7 @@
                 <a:spcPct val="20000"/>
               </a:spcBef>
               <a:buBlip>
-                <a:blip r:embed="rId4"/>
+                <a:blip r:embed="rId3"/>
               </a:buBlip>
               <a:defRPr sz="1400" i="1">
                 <a:solidFill>
@@ -23277,7 +23271,7 @@
                 <a:spcPct val="20000"/>
               </a:spcBef>
               <a:buBlip>
-                <a:blip r:embed="rId4"/>
+                <a:blip r:embed="rId3"/>
               </a:buBlip>
               <a:defRPr sz="2000">
                 <a:solidFill>
@@ -23317,7 +23311,7 @@
                 <a:spcPct val="20000"/>
               </a:spcBef>
               <a:buBlip>
-                <a:blip r:embed="rId4"/>
+                <a:blip r:embed="rId3"/>
               </a:buBlip>
               <a:defRPr sz="1400" i="1">
                 <a:solidFill>
@@ -23455,7 +23449,7 @@
           <p:nvPr/>
         </p:nvPicPr>
         <p:blipFill>
-          <a:blip r:embed="rId11" cstate="print">
+          <a:blip r:embed="rId8" cstate="print">
             <a:extLst>
               <a:ext uri="{28A0092B-C50C-407E-A947-70E740481C1C}">
                 <a14:useLocalDpi xmlns:a14="http://schemas.microsoft.com/office/drawing/2010/main" val="0"/>
@@ -23469,7 +23463,7 @@
         </p:blipFill>
         <p:spPr bwMode="auto">
           <a:xfrm>
-            <a:off x="7011741" y="2970761"/>
+            <a:off x="7027337" y="2677735"/>
             <a:ext cx="977117" cy="658986"/>
           </a:xfrm>
           <a:prstGeom prst="rect">
@@ -23496,7 +23490,7 @@
           <p:nvPr/>
         </p:nvPicPr>
         <p:blipFill>
-          <a:blip r:embed="rId12" cstate="print">
+          <a:blip r:embed="rId9" cstate="print">
             <a:extLst>
               <a:ext uri="{28A0092B-C50C-407E-A947-70E740481C1C}">
                 <a14:useLocalDpi xmlns:a14="http://schemas.microsoft.com/office/drawing/2010/main" val="0"/>
@@ -23510,7 +23504,7 @@
         </p:blipFill>
         <p:spPr bwMode="auto">
           <a:xfrm>
-            <a:off x="6901277" y="2368832"/>
+            <a:off x="6952891" y="1942206"/>
             <a:ext cx="1121432" cy="691115"/>
           </a:xfrm>
           <a:prstGeom prst="rect">
@@ -23537,7 +23531,7 @@
           <p:nvPr/>
         </p:nvPicPr>
         <p:blipFill>
-          <a:blip r:embed="rId11" cstate="print">
+          <a:blip r:embed="rId8" cstate="print">
             <a:extLst>
               <a:ext uri="{28A0092B-C50C-407E-A947-70E740481C1C}">
                 <a14:useLocalDpi xmlns:a14="http://schemas.microsoft.com/office/drawing/2010/main" val="0"/>
@@ -23551,7 +23545,7 @@
         </p:blipFill>
         <p:spPr bwMode="auto">
           <a:xfrm>
-            <a:off x="5186154" y="4168212"/>
+            <a:off x="6764136" y="4266719"/>
             <a:ext cx="977117" cy="658986"/>
           </a:xfrm>
           <a:prstGeom prst="rect">
@@ -23578,7 +23572,7 @@
           <p:nvPr/>
         </p:nvPicPr>
         <p:blipFill>
-          <a:blip r:embed="rId12" cstate="print">
+          <a:blip r:embed="rId9" cstate="print">
             <a:extLst>
               <a:ext uri="{28A0092B-C50C-407E-A947-70E740481C1C}">
                 <a14:useLocalDpi xmlns:a14="http://schemas.microsoft.com/office/drawing/2010/main" val="0"/>
@@ -23592,7 +23586,7 @@
         </p:blipFill>
         <p:spPr bwMode="auto">
           <a:xfrm>
-            <a:off x="5156030" y="3564655"/>
+            <a:off x="6764136" y="3602532"/>
             <a:ext cx="1121432" cy="691115"/>
           </a:xfrm>
           <a:prstGeom prst="rect">
@@ -23690,9 +23684,86 @@
           </a:p>
         </p:txBody>
       </p:sp>
+      <p:graphicFrame>
+        <p:nvGraphicFramePr>
+          <p:cNvPr id="23" name="Object 11">
+            <a:extLst>
+              <a:ext uri="{FF2B5EF4-FFF2-40B4-BE49-F238E27FC236}">
+                <a16:creationId xmlns:a16="http://schemas.microsoft.com/office/drawing/2014/main" id="{8985D8A4-2F87-4C2F-9469-F684D4D0BE5E}"/>
+              </a:ext>
+            </a:extLst>
+          </p:cNvPr>
+          <p:cNvGraphicFramePr>
+            <a:graphicFrameLocks noChangeAspect="1"/>
+          </p:cNvGraphicFramePr>
+          <p:nvPr>
+            <p:extLst>
+              <p:ext uri="{D42A27DB-BD31-4B8C-83A1-F6EECF244321}">
+                <p14:modId xmlns:p14="http://schemas.microsoft.com/office/powerpoint/2010/main" val="1578945747"/>
+              </p:ext>
+            </p:extLst>
+          </p:nvPr>
+        </p:nvGraphicFramePr>
+        <p:xfrm>
+          <a:off x="406400" y="3700057"/>
+          <a:ext cx="6304005" cy="1067660"/>
+        </p:xfrm>
+        <a:graphic>
+          <a:graphicData uri="http://schemas.openxmlformats.org/presentationml/2006/ole">
+            <mc:AlternateContent xmlns:mc="http://schemas.openxmlformats.org/markup-compatibility/2006">
+              <mc:Choice xmlns:v="urn:schemas-microsoft-com:vml" Requires="v">
+                <p:oleObj name="Equation" r:id="rId10" imgW="2997000" imgH="507960" progId="Equation.DSMT4">
+                  <p:embed/>
+                </p:oleObj>
+              </mc:Choice>
+              <mc:Fallback>
+                <p:oleObj name="Equation" r:id="rId10" imgW="2997000" imgH="507960" progId="Equation.DSMT4">
+                  <p:embed/>
+                  <p:pic>
+                    <p:nvPicPr>
+                      <p:cNvPr id="23" name="Object 11">
+                        <a:extLst>
+                          <a:ext uri="{FF2B5EF4-FFF2-40B4-BE49-F238E27FC236}">
+                            <a16:creationId xmlns:a16="http://schemas.microsoft.com/office/drawing/2014/main" id="{8985D8A4-2F87-4C2F-9469-F684D4D0BE5E}"/>
+                          </a:ext>
+                        </a:extLst>
+                      </p:cNvPr>
+                      <p:cNvPicPr>
+                        <a:picLocks noChangeAspect="1" noChangeArrowheads="1"/>
+                      </p:cNvPicPr>
+                      <p:nvPr/>
+                    </p:nvPicPr>
+                    <p:blipFill>
+                      <a:blip r:embed="rId11"/>
+                      <a:srcRect/>
+                      <a:stretch>
+                        <a:fillRect/>
+                      </a:stretch>
+                    </p:blipFill>
+                    <p:spPr bwMode="auto">
+                      <a:xfrm>
+                        <a:off x="406400" y="3700057"/>
+                        <a:ext cx="6304005" cy="1067660"/>
+                      </a:xfrm>
+                      <a:prstGeom prst="rect">
+                        <a:avLst/>
+                      </a:prstGeom>
+                      <a:noFill/>
+                      <a:ln>
+                        <a:noFill/>
+                      </a:ln>
+                      <a:effectLst/>
+                    </p:spPr>
+                  </p:pic>
+                </p:oleObj>
+              </mc:Fallback>
+            </mc:AlternateContent>
+          </a:graphicData>
+        </a:graphic>
+      </p:graphicFrame>
     </p:spTree>
     <p:custDataLst>
-      <p:tags r:id="rId2"/>
+      <p:tags r:id="rId1"/>
     </p:custDataLst>
   </p:cSld>
   <p:clrMapOvr>
@@ -24747,23 +24818,23 @@
           <a:graphicData uri="http://schemas.openxmlformats.org/presentationml/2006/ole">
             <mc:AlternateContent xmlns:mc="http://schemas.openxmlformats.org/markup-compatibility/2006">
               <mc:Choice xmlns:v="urn:schemas-microsoft-com:vml" Requires="v">
-                <p:oleObj spid="_x0000_s48566" name="Equation" r:id="rId4" imgW="3632040" imgH="507960" progId="Equation.DSMT4">
+                <p:oleObj name="Equation" r:id="rId3" imgW="3632040" imgH="507960" progId="Equation.DSMT4">
                   <p:embed/>
                 </p:oleObj>
               </mc:Choice>
               <mc:Fallback>
-                <p:oleObj name="Equation" r:id="rId4" imgW="3632040" imgH="507960" progId="Equation.DSMT4">
+                <p:oleObj name="Equation" r:id="rId3" imgW="3632040" imgH="507960" progId="Equation.DSMT4">
                   <p:embed/>
                   <p:pic>
                     <p:nvPicPr>
-                      <p:cNvPr id="0" name="图片 37944"/>
+                      <p:cNvPr id="12" name="Object 11"/>
                       <p:cNvPicPr>
                         <a:picLocks noChangeAspect="1" noChangeArrowheads="1"/>
                       </p:cNvPicPr>
                       <p:nvPr/>
                     </p:nvPicPr>
                     <p:blipFill>
-                      <a:blip r:embed="rId5"/>
+                      <a:blip r:embed="rId4"/>
                       <a:srcRect/>
                       <a:stretch>
                         <a:fillRect/>
@@ -24907,7 +24978,7 @@
                 <a:spcPct val="20000"/>
               </a:spcBef>
               <a:buBlip>
-                <a:blip r:embed="rId6"/>
+                <a:blip r:embed="rId5"/>
               </a:buBlip>
               <a:defRPr sz="2000">
                 <a:solidFill>
@@ -24947,7 +25018,7 @@
                 <a:spcPct val="20000"/>
               </a:spcBef>
               <a:buBlip>
-                <a:blip r:embed="rId6"/>
+                <a:blip r:embed="rId5"/>
               </a:buBlip>
               <a:defRPr sz="1400" i="1">
                 <a:solidFill>
@@ -25065,23 +25136,23 @@
           <a:graphicData uri="http://schemas.openxmlformats.org/presentationml/2006/ole">
             <mc:AlternateContent xmlns:mc="http://schemas.openxmlformats.org/markup-compatibility/2006">
               <mc:Choice xmlns:v="urn:schemas-microsoft-com:vml" Requires="v">
-                <p:oleObj spid="_x0000_s48567" name="Equation" r:id="rId7" imgW="520700" imgH="165100" progId="Equation.3">
+                <p:oleObj name="Equation" r:id="rId6" imgW="520700" imgH="165100" progId="Equation.3">
                   <p:embed/>
                 </p:oleObj>
               </mc:Choice>
               <mc:Fallback>
-                <p:oleObj name="Equation" r:id="rId7" imgW="520700" imgH="165100" progId="Equation.3">
+                <p:oleObj name="Equation" r:id="rId6" imgW="520700" imgH="165100" progId="Equation.3">
                   <p:embed/>
                   <p:pic>
                     <p:nvPicPr>
-                      <p:cNvPr id="0" name="图片 37944"/>
+                      <p:cNvPr id="9" name="Object 11"/>
                       <p:cNvPicPr>
                         <a:picLocks noChangeAspect="1" noChangeArrowheads="1"/>
                       </p:cNvPicPr>
                       <p:nvPr/>
                     </p:nvPicPr>
                     <p:blipFill>
-                      <a:blip r:embed="rId8"/>
+                      <a:blip r:embed="rId7"/>
                       <a:srcRect/>
                       <a:stretch>
                         <a:fillRect/>
@@ -25152,23 +25223,23 @@
           <a:graphicData uri="http://schemas.openxmlformats.org/presentationml/2006/ole">
             <mc:AlternateContent xmlns:mc="http://schemas.openxmlformats.org/markup-compatibility/2006">
               <mc:Choice xmlns:v="urn:schemas-microsoft-com:vml" Requires="v">
-                <p:oleObj spid="_x0000_s48568" name="Equation" r:id="rId9" imgW="495300" imgH="165100" progId="Equation.3">
+                <p:oleObj name="Equation" r:id="rId8" imgW="495300" imgH="165100" progId="Equation.3">
                   <p:embed/>
                 </p:oleObj>
               </mc:Choice>
               <mc:Fallback>
-                <p:oleObj name="Equation" r:id="rId9" imgW="495300" imgH="165100" progId="Equation.3">
+                <p:oleObj name="Equation" r:id="rId8" imgW="495300" imgH="165100" progId="Equation.3">
                   <p:embed/>
                   <p:pic>
                     <p:nvPicPr>
-                      <p:cNvPr id="0" name="图片 37944"/>
+                      <p:cNvPr id="14" name="Object 11"/>
                       <p:cNvPicPr>
                         <a:picLocks noChangeAspect="1" noChangeArrowheads="1"/>
                       </p:cNvPicPr>
                       <p:nvPr/>
                     </p:nvPicPr>
                     <p:blipFill>
-                      <a:blip r:embed="rId10"/>
+                      <a:blip r:embed="rId9"/>
                       <a:srcRect/>
                       <a:stretch>
                         <a:fillRect/>
@@ -25245,23 +25316,23 @@
           <a:graphicData uri="http://schemas.openxmlformats.org/presentationml/2006/ole">
             <mc:AlternateContent xmlns:mc="http://schemas.openxmlformats.org/markup-compatibility/2006">
               <mc:Choice xmlns:v="urn:schemas-microsoft-com:vml" Requires="v">
-                <p:oleObj spid="_x0000_s48569" name="Equation" r:id="rId11" imgW="2323800" imgH="685800" progId="Equation.DSMT4">
+                <p:oleObj name="Equation" r:id="rId10" imgW="2323800" imgH="685800" progId="Equation.DSMT4">
                   <p:embed/>
                 </p:oleObj>
               </mc:Choice>
               <mc:Fallback>
-                <p:oleObj name="Equation" r:id="rId11" imgW="2323800" imgH="685800" progId="Equation.DSMT4">
+                <p:oleObj name="Equation" r:id="rId10" imgW="2323800" imgH="685800" progId="Equation.DSMT4">
                   <p:embed/>
                   <p:pic>
                     <p:nvPicPr>
-                      <p:cNvPr id="0" name="图片 39974"/>
+                      <p:cNvPr id="55303" name="Object 3"/>
                       <p:cNvPicPr>
                         <a:picLocks noChangeAspect="1" noChangeArrowheads="1"/>
                       </p:cNvPicPr>
                       <p:nvPr/>
                     </p:nvPicPr>
                     <p:blipFill>
-                      <a:blip r:embed="rId12"/>
+                      <a:blip r:embed="rId11"/>
                       <a:srcRect/>
                       <a:stretch>
                         <a:fillRect/>
@@ -25338,7 +25409,7 @@
                 <a:spcPct val="0"/>
               </a:spcAft>
               <a:buBlip>
-                <a:blip r:embed="rId6"/>
+                <a:blip r:embed="rId5"/>
               </a:buBlip>
               <a:defRPr sz="2000">
                 <a:solidFill>
@@ -25389,7 +25460,7 @@
                 <a:spcPct val="0"/>
               </a:spcAft>
               <a:buBlip>
-                <a:blip r:embed="rId6"/>
+                <a:blip r:embed="rId5"/>
               </a:buBlip>
               <a:defRPr sz="1400" i="1">
                 <a:solidFill>
@@ -25541,7 +25612,7 @@
                 <a:spcPct val="20000"/>
               </a:spcBef>
               <a:buBlip>
-                <a:blip r:embed="rId6"/>
+                <a:blip r:embed="rId5"/>
               </a:buBlip>
               <a:defRPr sz="2000">
                 <a:solidFill>
@@ -25581,7 +25652,7 @@
                 <a:spcPct val="20000"/>
               </a:spcBef>
               <a:buBlip>
-                <a:blip r:embed="rId6"/>
+                <a:blip r:embed="rId5"/>
               </a:buBlip>
               <a:defRPr sz="1400" i="1">
                 <a:solidFill>
@@ -25742,7 +25813,7 @@
                 <a:spcPct val="20000"/>
               </a:spcBef>
               <a:buBlip>
-                <a:blip r:embed="rId6"/>
+                <a:blip r:embed="rId5"/>
               </a:buBlip>
               <a:defRPr sz="2000">
                 <a:solidFill>
@@ -25782,7 +25853,7 @@
                 <a:spcPct val="20000"/>
               </a:spcBef>
               <a:buBlip>
-                <a:blip r:embed="rId6"/>
+                <a:blip r:embed="rId5"/>
               </a:buBlip>
               <a:defRPr sz="1400" i="1">
                 <a:solidFill>
@@ -26163,7 +26234,7 @@
       </p:sp>
     </p:spTree>
     <p:custDataLst>
-      <p:tags r:id="rId2"/>
+      <p:tags r:id="rId1"/>
     </p:custDataLst>
   </p:cSld>
   <p:clrMapOvr>
@@ -26239,7 +26310,7 @@
                 <a:spcPct val="20000"/>
               </a:spcBef>
               <a:buBlip>
-                <a:blip r:embed="rId4"/>
+                <a:blip r:embed="rId3"/>
               </a:buBlip>
               <a:defRPr sz="2000">
                 <a:solidFill>
@@ -26279,7 +26350,7 @@
                 <a:spcPct val="20000"/>
               </a:spcBef>
               <a:buBlip>
-                <a:blip r:embed="rId4"/>
+                <a:blip r:embed="rId3"/>
               </a:buBlip>
               <a:defRPr sz="1400" i="1">
                 <a:solidFill>
@@ -26403,23 +26474,23 @@
           <a:graphicData uri="http://schemas.openxmlformats.org/presentationml/2006/ole">
             <mc:AlternateContent xmlns:mc="http://schemas.openxmlformats.org/markup-compatibility/2006">
               <mc:Choice xmlns:v="urn:schemas-microsoft-com:vml" Requires="v">
-                <p:oleObj spid="_x0000_s49372" name="Equation" r:id="rId5" imgW="2336760" imgH="457200" progId="Equation.DSMT4">
+                <p:oleObj name="Equation" r:id="rId4" imgW="2336760" imgH="457200" progId="Equation.DSMT4">
                   <p:embed/>
                 </p:oleObj>
               </mc:Choice>
               <mc:Fallback>
-                <p:oleObj name="Equation" r:id="rId5" imgW="2336760" imgH="457200" progId="Equation.DSMT4">
+                <p:oleObj name="Equation" r:id="rId4" imgW="2336760" imgH="457200" progId="Equation.DSMT4">
                   <p:embed/>
                   <p:pic>
                     <p:nvPicPr>
-                      <p:cNvPr id="0" name="图片 27800"/>
+                      <p:cNvPr id="6" name="Object 38"/>
                       <p:cNvPicPr>
                         <a:picLocks noChangeAspect="1" noChangeArrowheads="1"/>
                       </p:cNvPicPr>
                       <p:nvPr/>
                     </p:nvPicPr>
                     <p:blipFill>
-                      <a:blip r:embed="rId6"/>
+                      <a:blip r:embed="rId5"/>
                       <a:srcRect/>
                       <a:stretch>
                         <a:fillRect/>
@@ -26513,23 +26584,23 @@
           <a:graphicData uri="http://schemas.openxmlformats.org/presentationml/2006/ole">
             <mc:AlternateContent xmlns:mc="http://schemas.openxmlformats.org/markup-compatibility/2006">
               <mc:Choice xmlns:v="urn:schemas-microsoft-com:vml" Requires="v">
-                <p:oleObj spid="_x0000_s49373" name="Equation" r:id="rId7" imgW="1511300" imgH="508000" progId="Equation.3">
+                <p:oleObj name="Equation" r:id="rId6" imgW="1511300" imgH="508000" progId="Equation.3">
                   <p:embed/>
                 </p:oleObj>
               </mc:Choice>
               <mc:Fallback>
-                <p:oleObj name="Equation" r:id="rId7" imgW="1511300" imgH="508000" progId="Equation.3">
+                <p:oleObj name="Equation" r:id="rId6" imgW="1511300" imgH="508000" progId="Equation.3">
                   <p:embed/>
                   <p:pic>
                     <p:nvPicPr>
-                      <p:cNvPr id="0" name="图片 37944"/>
+                      <p:cNvPr id="4" name="Object 11"/>
                       <p:cNvPicPr>
                         <a:picLocks noChangeAspect="1" noChangeArrowheads="1"/>
                       </p:cNvPicPr>
                       <p:nvPr/>
                     </p:nvPicPr>
                     <p:blipFill>
-                      <a:blip r:embed="rId8"/>
+                      <a:blip r:embed="rId7"/>
                       <a:srcRect/>
                       <a:stretch>
                         <a:fillRect/>
@@ -26634,7 +26705,7 @@
                 <a:spcPct val="20000"/>
               </a:spcBef>
               <a:buBlip>
-                <a:blip r:embed="rId4"/>
+                <a:blip r:embed="rId3"/>
               </a:buBlip>
               <a:defRPr sz="2000">
                 <a:solidFill>
@@ -26674,7 +26745,7 @@
                 <a:spcPct val="20000"/>
               </a:spcBef>
               <a:buBlip>
-                <a:blip r:embed="rId4"/>
+                <a:blip r:embed="rId3"/>
               </a:buBlip>
               <a:defRPr sz="1400" i="1">
                 <a:solidFill>
@@ -26822,7 +26893,7 @@
                 <a:spcPct val="0"/>
               </a:spcAft>
               <a:buBlip>
-                <a:blip r:embed="rId4"/>
+                <a:blip r:embed="rId3"/>
               </a:buBlip>
               <a:defRPr sz="2000">
                 <a:solidFill>
@@ -26873,7 +26944,7 @@
                 <a:spcPct val="0"/>
               </a:spcAft>
               <a:buBlip>
-                <a:blip r:embed="rId4"/>
+                <a:blip r:embed="rId3"/>
               </a:buBlip>
               <a:defRPr sz="1400" i="1">
                 <a:solidFill>
@@ -27089,7 +27160,7 @@
                 <a:spcPct val="20000"/>
               </a:spcBef>
               <a:buBlip>
-                <a:blip r:embed="rId4"/>
+                <a:blip r:embed="rId3"/>
               </a:buBlip>
               <a:defRPr sz="2000">
                 <a:solidFill>
@@ -27129,7 +27200,7 @@
                 <a:spcPct val="20000"/>
               </a:spcBef>
               <a:buBlip>
-                <a:blip r:embed="rId4"/>
+                <a:blip r:embed="rId3"/>
               </a:buBlip>
               <a:defRPr sz="1400" i="1">
                 <a:solidFill>
@@ -27290,7 +27361,7 @@
                 <a:spcPct val="20000"/>
               </a:spcBef>
               <a:buBlip>
-                <a:blip r:embed="rId4"/>
+                <a:blip r:embed="rId3"/>
               </a:buBlip>
               <a:defRPr sz="2000">
                 <a:solidFill>
@@ -27330,7 +27401,7 @@
                 <a:spcPct val="20000"/>
               </a:spcBef>
               <a:buBlip>
-                <a:blip r:embed="rId4"/>
+                <a:blip r:embed="rId3"/>
               </a:buBlip>
               <a:defRPr sz="1400" i="1">
                 <a:solidFill>
@@ -27468,7 +27539,7 @@
           <p:nvPr/>
         </p:nvPicPr>
         <p:blipFill>
-          <a:blip r:embed="rId9" cstate="print">
+          <a:blip r:embed="rId8" cstate="print">
             <a:extLst>
               <a:ext uri="{28A0092B-C50C-407E-A947-70E740481C1C}">
                 <a14:useLocalDpi xmlns:a14="http://schemas.microsoft.com/office/drawing/2010/main" val="0"/>
@@ -27509,7 +27580,7 @@
           <p:nvPr/>
         </p:nvPicPr>
         <p:blipFill>
-          <a:blip r:embed="rId10" cstate="print">
+          <a:blip r:embed="rId9" cstate="print">
             <a:extLst>
               <a:ext uri="{28A0092B-C50C-407E-A947-70E740481C1C}">
                 <a14:useLocalDpi xmlns:a14="http://schemas.microsoft.com/office/drawing/2010/main" val="0"/>
@@ -27663,7 +27734,7 @@
       </p:sp>
     </p:spTree>
     <p:custDataLst>
-      <p:tags r:id="rId2"/>
+      <p:tags r:id="rId1"/>
     </p:custDataLst>
   </p:cSld>
   <p:clrMapOvr>
@@ -27806,7 +27877,7 @@
                 <a:spcPct val="20000"/>
               </a:spcBef>
               <a:buBlip>
-                <a:blip r:embed="rId4"/>
+                <a:blip r:embed="rId3"/>
               </a:buBlip>
               <a:defRPr sz="2000">
                 <a:solidFill>
@@ -27846,7 +27917,7 @@
                 <a:spcPct val="20000"/>
               </a:spcBef>
               <a:buBlip>
-                <a:blip r:embed="rId4"/>
+                <a:blip r:embed="rId3"/>
               </a:buBlip>
               <a:defRPr sz="1400" i="1">
                 <a:solidFill>
@@ -28007,7 +28078,7 @@
                 <a:spcPct val="20000"/>
               </a:spcBef>
               <a:buBlip>
-                <a:blip r:embed="rId4"/>
+                <a:blip r:embed="rId3"/>
               </a:buBlip>
               <a:defRPr sz="2000">
                 <a:solidFill>
@@ -28047,7 +28118,7 @@
                 <a:spcPct val="20000"/>
               </a:spcBef>
               <a:buBlip>
-                <a:blip r:embed="rId4"/>
+                <a:blip r:embed="rId3"/>
               </a:buBlip>
               <a:defRPr sz="1400" i="1">
                 <a:solidFill>
@@ -28267,12 +28338,12 @@
           <a:graphicData uri="http://schemas.openxmlformats.org/presentationml/2006/ole">
             <mc:AlternateContent xmlns:mc="http://schemas.openxmlformats.org/markup-compatibility/2006">
               <mc:Choice xmlns:v="urn:schemas-microsoft-com:vml" Requires="v">
-                <p:oleObj spid="_x0000_s73804" name="Visio" r:id="rId5" imgW="3174882" imgH="2444717" progId="Visio.Drawing.15">
+                <p:oleObj name="Visio" r:id="rId4" imgW="3174882" imgH="2444717" progId="Visio.Drawing.15">
                   <p:embed/>
                 </p:oleObj>
               </mc:Choice>
               <mc:Fallback>
-                <p:oleObj name="Visio" r:id="rId5" imgW="3174882" imgH="2444717" progId="Visio.Drawing.15">
+                <p:oleObj name="Visio" r:id="rId4" imgW="3174882" imgH="2444717" progId="Visio.Drawing.15">
                   <p:embed/>
                   <p:pic>
                     <p:nvPicPr>
@@ -28289,7 +28360,7 @@
                       <p:nvPr/>
                     </p:nvPicPr>
                     <p:blipFill>
-                      <a:blip r:embed="rId6">
+                      <a:blip r:embed="rId5">
                         <a:extLst>
                           <a:ext uri="{28A0092B-C50C-407E-A947-70E740481C1C}">
                             <a14:useLocalDpi xmlns:a14="http://schemas.microsoft.com/office/drawing/2010/main" val="0"/>
@@ -28346,12 +28417,12 @@
           <a:graphicData uri="http://schemas.openxmlformats.org/presentationml/2006/ole">
             <mc:AlternateContent xmlns:mc="http://schemas.openxmlformats.org/markup-compatibility/2006">
               <mc:Choice xmlns:v="urn:schemas-microsoft-com:vml" Requires="v">
-                <p:oleObj spid="_x0000_s73805" name="Visio" r:id="rId7" imgW="2533739" imgH="2914828" progId="Visio.Drawing.15">
+                <p:oleObj name="Visio" r:id="rId6" imgW="2533739" imgH="2914828" progId="Visio.Drawing.15">
                   <p:embed/>
                 </p:oleObj>
               </mc:Choice>
               <mc:Fallback>
-                <p:oleObj name="Visio" r:id="rId7" imgW="2533739" imgH="2914828" progId="Visio.Drawing.15">
+                <p:oleObj name="Visio" r:id="rId6" imgW="2533739" imgH="2914828" progId="Visio.Drawing.15">
                   <p:embed/>
                   <p:pic>
                     <p:nvPicPr>
@@ -28368,7 +28439,7 @@
                       <p:nvPr/>
                     </p:nvPicPr>
                     <p:blipFill>
-                      <a:blip r:embed="rId8">
+                      <a:blip r:embed="rId7">
                         <a:extLst>
                           <a:ext uri="{28A0092B-C50C-407E-A947-70E740481C1C}">
                             <a14:useLocalDpi xmlns:a14="http://schemas.microsoft.com/office/drawing/2010/main" val="0"/>
@@ -28517,7 +28588,7 @@
           <p:nvPr/>
         </p:nvPicPr>
         <p:blipFill>
-          <a:blip r:embed="rId9"/>
+          <a:blip r:embed="rId8"/>
           <a:stretch>
             <a:fillRect/>
           </a:stretch>
@@ -29061,7 +29132,7 @@
       </p:pic>
     </p:spTree>
     <p:custDataLst>
-      <p:tags r:id="rId2"/>
+      <p:tags r:id="rId1"/>
     </p:custDataLst>
     <p:extLst>
       <p:ext uri="{BB962C8B-B14F-4D97-AF65-F5344CB8AC3E}">
@@ -29185,7 +29256,7 @@
                 <a:spcPct val="20000"/>
               </a:spcBef>
               <a:buBlip>
-                <a:blip r:embed="rId4"/>
+                <a:blip r:embed="rId3"/>
               </a:buBlip>
               <a:defRPr sz="2000">
                 <a:solidFill>
@@ -29225,7 +29296,7 @@
                 <a:spcPct val="20000"/>
               </a:spcBef>
               <a:buBlip>
-                <a:blip r:embed="rId4"/>
+                <a:blip r:embed="rId3"/>
               </a:buBlip>
               <a:defRPr sz="1400" i="1">
                 <a:solidFill>
@@ -29386,7 +29457,7 @@
                 <a:spcPct val="20000"/>
               </a:spcBef>
               <a:buBlip>
-                <a:blip r:embed="rId4"/>
+                <a:blip r:embed="rId3"/>
               </a:buBlip>
               <a:defRPr sz="2000">
                 <a:solidFill>
@@ -29426,7 +29497,7 @@
                 <a:spcPct val="20000"/>
               </a:spcBef>
               <a:buBlip>
-                <a:blip r:embed="rId4"/>
+                <a:blip r:embed="rId3"/>
               </a:buBlip>
               <a:defRPr sz="1400" i="1">
                 <a:solidFill>
@@ -29745,7 +29816,7 @@
           <p:nvPr/>
         </p:nvPicPr>
         <p:blipFill>
-          <a:blip r:embed="rId5"/>
+          <a:blip r:embed="rId4"/>
           <a:stretch>
             <a:fillRect/>
           </a:stretch>
@@ -29788,19 +29859,19 @@
           <a:graphicData uri="http://schemas.openxmlformats.org/presentationml/2006/ole">
             <mc:AlternateContent xmlns:mc="http://schemas.openxmlformats.org/markup-compatibility/2006">
               <mc:Choice xmlns:v="urn:schemas-microsoft-com:vml" Requires="v">
-                <p:oleObj spid="_x0000_s75787" name="Visio" r:id="rId6" imgW="2533739" imgH="2914828" progId="Visio.Drawing.15">
+                <p:oleObj name="Visio" r:id="rId5" imgW="2533739" imgH="2914828" progId="Visio.Drawing.15">
                   <p:embed/>
                 </p:oleObj>
               </mc:Choice>
               <mc:Fallback>
-                <p:oleObj name="Visio" r:id="rId6" imgW="2533739" imgH="2914828" progId="Visio.Drawing.15">
+                <p:oleObj name="Visio" r:id="rId5" imgW="2533739" imgH="2914828" progId="Visio.Drawing.15">
                   <p:embed/>
                   <p:pic>
                     <p:nvPicPr>
-                      <p:cNvPr id="7" name="对象 6">
+                      <p:cNvPr id="13" name="对象 6">
                         <a:extLst>
                           <a:ext uri="{FF2B5EF4-FFF2-40B4-BE49-F238E27FC236}">
-                            <a16:creationId xmlns:a16="http://schemas.microsoft.com/office/drawing/2014/main" id="{61BCB202-DFBD-4761-A3CE-D7429423C34F}"/>
+                            <a16:creationId xmlns:a16="http://schemas.microsoft.com/office/drawing/2014/main" id="{81051A40-7956-4293-8607-97CB6876D250}"/>
                           </a:ext>
                         </a:extLst>
                       </p:cNvPr>
@@ -29810,7 +29881,7 @@
                       <p:nvPr/>
                     </p:nvPicPr>
                     <p:blipFill>
-                      <a:blip r:embed="rId7">
+                      <a:blip r:embed="rId6">
                         <a:extLst>
                           <a:ext uri="{28A0092B-C50C-407E-A947-70E740481C1C}">
                             <a14:useLocalDpi xmlns:a14="http://schemas.microsoft.com/office/drawing/2010/main" val="0"/>
@@ -29900,7 +29971,7 @@
           <p:nvPr/>
         </p:nvPicPr>
         <p:blipFill>
-          <a:blip r:embed="rId8"/>
+          <a:blip r:embed="rId7"/>
           <a:stretch>
             <a:fillRect/>
           </a:stretch>
@@ -29957,7 +30028,7 @@
       </p:sp>
     </p:spTree>
     <p:custDataLst>
-      <p:tags r:id="rId2"/>
+      <p:tags r:id="rId1"/>
     </p:custDataLst>
     <p:extLst>
       <p:ext uri="{BB962C8B-B14F-4D97-AF65-F5344CB8AC3E}">
@@ -30640,7 +30711,7 @@
           <a:graphicData uri="http://schemas.openxmlformats.org/presentationml/2006/ole">
             <mc:AlternateContent xmlns:mc="http://schemas.openxmlformats.org/markup-compatibility/2006">
               <mc:Choice xmlns:v="urn:schemas-microsoft-com:vml" Requires="v">
-                <p:oleObj spid="_x0000_s76811" name="Visio" r:id="rId6" imgW="2533739" imgH="2914828" progId="Visio.Drawing.15">
+                <p:oleObj name="Visio" r:id="rId6" imgW="2533739" imgH="2914828" progId="Visio.Drawing.15">
                   <p:embed/>
                 </p:oleObj>
               </mc:Choice>
@@ -30649,10 +30720,10 @@
                   <p:embed/>
                   <p:pic>
                     <p:nvPicPr>
-                      <p:cNvPr id="13" name="对象 6">
+                      <p:cNvPr id="14" name="对象 6">
                         <a:extLst>
                           <a:ext uri="{FF2B5EF4-FFF2-40B4-BE49-F238E27FC236}">
-                            <a16:creationId xmlns:a16="http://schemas.microsoft.com/office/drawing/2014/main" id="{81051A40-7956-4293-8607-97CB6876D250}"/>
+                            <a16:creationId xmlns:a16="http://schemas.microsoft.com/office/drawing/2014/main" id="{9E327834-6467-4F36-940C-E208E2089DA5}"/>
                           </a:ext>
                         </a:extLst>
                       </p:cNvPr>
@@ -30693,7 +30764,7 @@
       </p:graphicFrame>
     </p:spTree>
     <p:custDataLst>
-      <p:tags r:id="rId2"/>
+      <p:tags r:id="rId1"/>
     </p:custDataLst>
     <p:extLst>
       <p:ext uri="{BB962C8B-B14F-4D97-AF65-F5344CB8AC3E}">
@@ -38032,7 +38103,7 @@
                                     </a:solidFill>
                                     <a:latin typeface="Cambria Math" panose="02040503050406030204" pitchFamily="18" charset="0"/>
                                   </a:rPr>
-                                  <m:t>−2</m:t>
+                                  <m:t>−</m:t>
                                 </m:r>
                                 <m:sSub>
                                   <m:sSubPr>
@@ -41074,7 +41145,7 @@
                 <a:spcPct val="20000"/>
               </a:spcBef>
               <a:buBlip>
-                <a:blip r:embed="rId5"/>
+                <a:blip r:embed="rId4"/>
               </a:buBlip>
               <a:defRPr sz="2000">
                 <a:solidFill>
@@ -41114,7 +41185,7 @@
                 <a:spcPct val="20000"/>
               </a:spcBef>
               <a:buBlip>
-                <a:blip r:embed="rId5"/>
+                <a:blip r:embed="rId4"/>
               </a:buBlip>
               <a:defRPr sz="1400" i="1">
                 <a:solidFill>
@@ -41513,12 +41584,12 @@
           <a:graphicData uri="http://schemas.openxmlformats.org/presentationml/2006/ole">
             <mc:AlternateContent xmlns:mc="http://schemas.openxmlformats.org/markup-compatibility/2006">
               <mc:Choice xmlns:v="urn:schemas-microsoft-com:vml" Requires="v">
-                <p:oleObj spid="_x0000_s68712" r:id="rId6" imgW="1752600" imgH="203200" progId="Equation.KSEE3">
+                <p:oleObj r:id="rId5" imgW="1752600" imgH="203200" progId="Equation.KSEE3">
                   <p:embed/>
                 </p:oleObj>
               </mc:Choice>
               <mc:Fallback>
-                <p:oleObj r:id="rId6" imgW="1752600" imgH="203200" progId="Equation.KSEE3">
+                <p:oleObj r:id="rId5" imgW="1752600" imgH="203200" progId="Equation.KSEE3">
                   <p:embed/>
                   <p:pic>
                     <p:nvPicPr>
@@ -41529,7 +41600,7 @@
                       <p:nvPr/>
                     </p:nvPicPr>
                     <p:blipFill>
-                      <a:blip r:embed="rId7"/>
+                      <a:blip r:embed="rId6"/>
                       <a:stretch>
                         <a:fillRect/>
                       </a:stretch>
@@ -41669,7 +41740,7 @@
                 <a:spcPct val="20000"/>
               </a:spcBef>
               <a:buBlip>
-                <a:blip r:embed="rId5"/>
+                <a:blip r:embed="rId4"/>
               </a:buBlip>
               <a:defRPr sz="2000">
                 <a:solidFill>
@@ -41709,7 +41780,7 @@
                 <a:spcPct val="20000"/>
               </a:spcBef>
               <a:buBlip>
-                <a:blip r:embed="rId5"/>
+                <a:blip r:embed="rId4"/>
               </a:buBlip>
               <a:defRPr sz="1400" i="1">
                 <a:solidFill>
@@ -41870,7 +41941,7 @@
                 <a:spcPct val="20000"/>
               </a:spcBef>
               <a:buBlip>
-                <a:blip r:embed="rId5"/>
+                <a:blip r:embed="rId4"/>
               </a:buBlip>
               <a:defRPr sz="2000">
                 <a:solidFill>
@@ -41910,7 +41981,7 @@
                 <a:spcPct val="20000"/>
               </a:spcBef>
               <a:buBlip>
-                <a:blip r:embed="rId5"/>
+                <a:blip r:embed="rId4"/>
               </a:buBlip>
               <a:defRPr sz="1400" i="1">
                 <a:solidFill>
@@ -42041,7 +42112,7 @@
       </p:sp>
     </p:spTree>
     <p:custDataLst>
-      <p:tags r:id="rId2"/>
+      <p:tags r:id="rId1"/>
     </p:custDataLst>
   </p:cSld>
   <p:clrMapOvr>
@@ -45158,7 +45229,7 @@
                 <a:spcPct val="0"/>
               </a:spcAft>
               <a:buBlip>
-                <a:blip r:embed="rId4"/>
+                <a:blip r:embed="rId3"/>
               </a:buBlip>
               <a:defRPr sz="2000">
                 <a:solidFill>
@@ -45209,7 +45280,7 @@
                 <a:spcPct val="0"/>
               </a:spcAft>
               <a:buBlip>
-                <a:blip r:embed="rId4"/>
+                <a:blip r:embed="rId3"/>
               </a:buBlip>
               <a:defRPr sz="1400" i="1">
                 <a:solidFill>
@@ -45361,7 +45432,7 @@
                 <a:spcPct val="20000"/>
               </a:spcBef>
               <a:buBlip>
-                <a:blip r:embed="rId4"/>
+                <a:blip r:embed="rId3"/>
               </a:buBlip>
               <a:defRPr sz="2000">
                 <a:solidFill>
@@ -45401,7 +45472,7 @@
                 <a:spcPct val="20000"/>
               </a:spcBef>
               <a:buBlip>
-                <a:blip r:embed="rId4"/>
+                <a:blip r:embed="rId3"/>
               </a:buBlip>
               <a:defRPr sz="1400" i="1">
                 <a:solidFill>
@@ -45562,7 +45633,7 @@
                 <a:spcPct val="20000"/>
               </a:spcBef>
               <a:buBlip>
-                <a:blip r:embed="rId4"/>
+                <a:blip r:embed="rId3"/>
               </a:buBlip>
               <a:defRPr sz="2000">
                 <a:solidFill>
@@ -45602,7 +45673,7 @@
                 <a:spcPct val="20000"/>
               </a:spcBef>
               <a:buBlip>
-                <a:blip r:embed="rId4"/>
+                <a:blip r:embed="rId3"/>
               </a:buBlip>
               <a:defRPr sz="1400" i="1">
                 <a:solidFill>
@@ -45740,7 +45811,7 @@
           <p:nvPr/>
         </p:nvPicPr>
         <p:blipFill>
-          <a:blip r:embed="rId5"/>
+          <a:blip r:embed="rId4"/>
           <a:stretch>
             <a:fillRect/>
           </a:stretch>
@@ -45764,7 +45835,7 @@
           <p:nvPr/>
         </p:nvPicPr>
         <p:blipFill>
-          <a:blip r:embed="rId6">
+          <a:blip r:embed="rId5">
             <a:extLst>
               <a:ext uri="{28A0092B-C50C-407E-A947-70E740481C1C}">
                 <a14:useLocalDpi xmlns:a14="http://schemas.microsoft.com/office/drawing/2010/main" val="0"/>
@@ -46079,23 +46150,23 @@
           <a:graphicData uri="http://schemas.openxmlformats.org/presentationml/2006/ole">
             <mc:AlternateContent xmlns:mc="http://schemas.openxmlformats.org/markup-compatibility/2006">
               <mc:Choice xmlns:v="urn:schemas-microsoft-com:vml" Requires="v">
-                <p:oleObj spid="_x0000_s37090" name="Equation" r:id="rId7" imgW="774065" imgH="393700" progId="Equation.3">
+                <p:oleObj name="Equation" r:id="rId6" imgW="774065" imgH="393700" progId="Equation.3">
                   <p:embed/>
                 </p:oleObj>
               </mc:Choice>
               <mc:Fallback>
-                <p:oleObj name="Equation" r:id="rId7" imgW="774065" imgH="393700" progId="Equation.3">
+                <p:oleObj name="Equation" r:id="rId6" imgW="774065" imgH="393700" progId="Equation.3">
                   <p:embed/>
                   <p:pic>
                     <p:nvPicPr>
-                      <p:cNvPr id="7" name="Object 38"/>
+                      <p:cNvPr id="12" name="Object 38"/>
                       <p:cNvPicPr>
                         <a:picLocks noChangeAspect="1" noChangeArrowheads="1"/>
                       </p:cNvPicPr>
                       <p:nvPr/>
                     </p:nvPicPr>
                     <p:blipFill>
-                      <a:blip r:embed="rId8"/>
+                      <a:blip r:embed="rId7"/>
                       <a:srcRect/>
                       <a:stretch>
                         <a:fillRect/>
@@ -46162,23 +46233,23 @@
           <a:graphicData uri="http://schemas.openxmlformats.org/presentationml/2006/ole">
             <mc:AlternateContent xmlns:mc="http://schemas.openxmlformats.org/markup-compatibility/2006">
               <mc:Choice xmlns:v="urn:schemas-microsoft-com:vml" Requires="v">
-                <p:oleObj spid="_x0000_s37091" name="Equation" r:id="rId9" imgW="774065" imgH="393700" progId="Equation.3">
+                <p:oleObj name="Equation" r:id="rId8" imgW="774065" imgH="393700" progId="Equation.3">
                   <p:embed/>
                 </p:oleObj>
               </mc:Choice>
               <mc:Fallback>
-                <p:oleObj name="Equation" r:id="rId9" imgW="774065" imgH="393700" progId="Equation.3">
+                <p:oleObj name="Equation" r:id="rId8" imgW="774065" imgH="393700" progId="Equation.3">
                   <p:embed/>
                   <p:pic>
                     <p:nvPicPr>
-                      <p:cNvPr id="9" name="Object 38"/>
+                      <p:cNvPr id="13" name="Object 38"/>
                       <p:cNvPicPr>
                         <a:picLocks noChangeAspect="1" noChangeArrowheads="1"/>
                       </p:cNvPicPr>
                       <p:nvPr/>
                     </p:nvPicPr>
                     <p:blipFill>
-                      <a:blip r:embed="rId10"/>
+                      <a:blip r:embed="rId9"/>
                       <a:srcRect/>
                       <a:stretch>
                         <a:fillRect/>
@@ -46225,7 +46296,7 @@
       </p:graphicFrame>
     </p:spTree>
     <p:custDataLst>
-      <p:tags r:id="rId2"/>
+      <p:tags r:id="rId1"/>
     </p:custDataLst>
   </p:cSld>
   <p:clrMapOvr>

</xml_diff>